<commit_message>
finished up initial proposal and presentation
</commit_message>
<xml_diff>
--- a/documentation/presentation.pptx
+++ b/documentation/presentation.pptx
@@ -5,10 +5,10 @@
     <p:sldMasterId id="2147483780" r:id="rId3"/>
   </p:sldMasterIdLst>
   <p:notesMasterIdLst>
-    <p:notesMasterId r:id="rId16"/>
+    <p:notesMasterId r:id="rId22"/>
   </p:notesMasterIdLst>
   <p:handoutMasterIdLst>
-    <p:handoutMasterId r:id="rId17"/>
+    <p:handoutMasterId r:id="rId23"/>
   </p:handoutMasterIdLst>
   <p:sldIdLst>
     <p:sldId id="256" r:id="rId4"/>
@@ -16,13 +16,19 @@
     <p:sldId id="261" r:id="rId6"/>
     <p:sldId id="262" r:id="rId7"/>
     <p:sldId id="257" r:id="rId8"/>
-    <p:sldId id="258" r:id="rId9"/>
-    <p:sldId id="259" r:id="rId10"/>
-    <p:sldId id="263" r:id="rId11"/>
+    <p:sldId id="259" r:id="rId9"/>
+    <p:sldId id="263" r:id="rId10"/>
+    <p:sldId id="273" r:id="rId11"/>
     <p:sldId id="265" r:id="rId12"/>
     <p:sldId id="264" r:id="rId13"/>
-    <p:sldId id="266" r:id="rId14"/>
-    <p:sldId id="268" r:id="rId15"/>
+    <p:sldId id="258" r:id="rId14"/>
+    <p:sldId id="270" r:id="rId15"/>
+    <p:sldId id="271" r:id="rId16"/>
+    <p:sldId id="272" r:id="rId17"/>
+    <p:sldId id="268" r:id="rId18"/>
+    <p:sldId id="266" r:id="rId19"/>
+    <p:sldId id="275" r:id="rId20"/>
+    <p:sldId id="274" r:id="rId21"/>
   </p:sldIdLst>
   <p:sldSz cx="12192000" cy="6858000"/>
   <p:notesSz cx="6858000" cy="9144000"/>
@@ -121,6 +127,11 @@
       </a:defRPr>
     </a:lvl9pPr>
   </p:defaultTextStyle>
+  <p:extLst>
+    <p:ext uri="{EFAFB233-063F-42B5-8137-9DF3F51BA10A}">
+      <p15:sldGuideLst xmlns:p15="http://schemas.microsoft.com/office/powerpoint/2012/main"/>
+    </p:ext>
+  </p:extLst>
 </p:presentation>
 </file>
 
@@ -206,7 +217,7 @@
           <a:p>
             <a:fld id="{A856B199-1789-4443-9DE1-FA33660B713B}" type="datetimeFigureOut">
               <a:rPr lang="en-US" smtClean="0"/>
-              <a:t>10/22/2018</a:t>
+              <a:t>11/27/2018</a:t>
             </a:fld>
             <a:endParaRPr lang="en-US"/>
           </a:p>
@@ -371,7 +382,7 @@
           <a:p>
             <a:fld id="{0DCB8767-B91D-4925-A33B-64438006F0C1}" type="datetimeFigureOut">
               <a:rPr lang="en-US" smtClean="0"/>
-              <a:t>10/22/2018</a:t>
+              <a:t>11/27/2018</a:t>
             </a:fld>
             <a:endParaRPr lang="en-US"/>
           </a:p>
@@ -928,7 +939,7 @@
           <a:bodyPr/>
           <a:lstStyle/>
           <a:p>
-            <a:endParaRPr lang="en-US" dirty="0"/>
+            <a:endParaRPr lang="en-US"/>
           </a:p>
         </p:txBody>
       </p:sp>
@@ -996,7 +1007,7 @@
     </p:spTree>
     <p:extLst>
       <p:ext uri="{BB962C8B-B14F-4D97-AF65-F5344CB8AC3E}">
-        <p14:creationId xmlns:p14="http://schemas.microsoft.com/office/powerpoint/2010/main" val="832951166"/>
+        <p14:creationId xmlns:p14="http://schemas.microsoft.com/office/powerpoint/2010/main" val="3125904450"/>
       </p:ext>
     </p:extLst>
   </p:cSld>
@@ -1118,7 +1129,739 @@
     </p:spTree>
     <p:extLst>
       <p:ext uri="{BB962C8B-B14F-4D97-AF65-F5344CB8AC3E}">
+        <p14:creationId xmlns:p14="http://schemas.microsoft.com/office/powerpoint/2010/main" val="188547113"/>
+      </p:ext>
+    </p:extLst>
+  </p:cSld>
+  <p:clrMapOvr>
+    <a:masterClrMapping/>
+  </p:clrMapOvr>
+</p:notes>
+</file>
+
+<file path=ppt/notesSlides/notesSlide13.xml><?xml version="1.0" encoding="utf-8"?>
+<p:notes xmlns:a="http://schemas.openxmlformats.org/drawingml/2006/main" xmlns:r="http://schemas.openxmlformats.org/officeDocument/2006/relationships" xmlns:p="http://schemas.openxmlformats.org/presentationml/2006/main">
+  <p:cSld>
+    <p:spTree>
+      <p:nvGrpSpPr>
+        <p:cNvPr id="1" name=""/>
+        <p:cNvGrpSpPr/>
+        <p:nvPr/>
+      </p:nvGrpSpPr>
+      <p:grpSpPr>
+        <a:xfrm>
+          <a:off x="0" y="0"/>
+          <a:ext cx="0" cy="0"/>
+          <a:chOff x="0" y="0"/>
+          <a:chExt cx="0" cy="0"/>
+        </a:xfrm>
+      </p:grpSpPr>
+      <p:sp>
+        <p:nvSpPr>
+          <p:cNvPr id="2" name="Slide Image Placeholder 1"/>
+          <p:cNvSpPr>
+            <a:spLocks noGrp="1" noRot="1" noChangeAspect="1"/>
+          </p:cNvSpPr>
+          <p:nvPr>
+            <p:ph type="sldImg"/>
+          </p:nvPr>
+        </p:nvSpPr>
+        <p:spPr/>
+      </p:sp>
+      <p:sp>
+        <p:nvSpPr>
+          <p:cNvPr id="3" name="Notes Placeholder 2"/>
+          <p:cNvSpPr>
+            <a:spLocks noGrp="1"/>
+          </p:cNvSpPr>
+          <p:nvPr>
+            <p:ph type="body" idx="1"/>
+          </p:nvPr>
+        </p:nvSpPr>
+        <p:spPr/>
+        <p:txBody>
+          <a:bodyPr/>
+          <a:lstStyle/>
+          <a:p>
+            <a:endParaRPr lang="en-US" dirty="0"/>
+          </a:p>
+        </p:txBody>
+      </p:sp>
+      <p:sp>
+        <p:nvSpPr>
+          <p:cNvPr id="4" name="Header Placeholder 3"/>
+          <p:cNvSpPr>
+            <a:spLocks noGrp="1"/>
+          </p:cNvSpPr>
+          <p:nvPr>
+            <p:ph type="hdr" sz="quarter" idx="10"/>
+          </p:nvPr>
+        </p:nvSpPr>
+        <p:spPr/>
+        <p:txBody>
+          <a:bodyPr/>
+          <a:lstStyle/>
+          <a:p>
+            <a:endParaRPr lang="en-US"/>
+          </a:p>
+        </p:txBody>
+      </p:sp>
+      <p:sp>
+        <p:nvSpPr>
+          <p:cNvPr id="5" name="Footer Placeholder 4"/>
+          <p:cNvSpPr>
+            <a:spLocks noGrp="1"/>
+          </p:cNvSpPr>
+          <p:nvPr>
+            <p:ph type="ftr" sz="quarter" idx="11"/>
+          </p:nvPr>
+        </p:nvSpPr>
+        <p:spPr/>
+        <p:txBody>
+          <a:bodyPr/>
+          <a:lstStyle/>
+          <a:p>
+            <a:endParaRPr lang="en-US"/>
+          </a:p>
+        </p:txBody>
+      </p:sp>
+      <p:sp>
+        <p:nvSpPr>
+          <p:cNvPr id="6" name="Slide Number Placeholder 5"/>
+          <p:cNvSpPr>
+            <a:spLocks noGrp="1"/>
+          </p:cNvSpPr>
+          <p:nvPr>
+            <p:ph type="sldNum" sz="quarter" idx="12"/>
+          </p:nvPr>
+        </p:nvSpPr>
+        <p:spPr/>
+        <p:txBody>
+          <a:bodyPr/>
+          <a:lstStyle/>
+          <a:p>
+            <a:fld id="{04AFFD27-C42C-47CD-8755-C4DF35BD4C7E}" type="slidenum">
+              <a:rPr lang="en-US" smtClean="0"/>
+              <a:t>13</a:t>
+            </a:fld>
+            <a:endParaRPr lang="en-US"/>
+          </a:p>
+        </p:txBody>
+      </p:sp>
+    </p:spTree>
+    <p:extLst>
+      <p:ext uri="{BB962C8B-B14F-4D97-AF65-F5344CB8AC3E}">
+        <p14:creationId xmlns:p14="http://schemas.microsoft.com/office/powerpoint/2010/main" val="1099259115"/>
+      </p:ext>
+    </p:extLst>
+  </p:cSld>
+  <p:clrMapOvr>
+    <a:masterClrMapping/>
+  </p:clrMapOvr>
+</p:notes>
+</file>
+
+<file path=ppt/notesSlides/notesSlide14.xml><?xml version="1.0" encoding="utf-8"?>
+<p:notes xmlns:a="http://schemas.openxmlformats.org/drawingml/2006/main" xmlns:r="http://schemas.openxmlformats.org/officeDocument/2006/relationships" xmlns:p="http://schemas.openxmlformats.org/presentationml/2006/main">
+  <p:cSld>
+    <p:spTree>
+      <p:nvGrpSpPr>
+        <p:cNvPr id="1" name=""/>
+        <p:cNvGrpSpPr/>
+        <p:nvPr/>
+      </p:nvGrpSpPr>
+      <p:grpSpPr>
+        <a:xfrm>
+          <a:off x="0" y="0"/>
+          <a:ext cx="0" cy="0"/>
+          <a:chOff x="0" y="0"/>
+          <a:chExt cx="0" cy="0"/>
+        </a:xfrm>
+      </p:grpSpPr>
+      <p:sp>
+        <p:nvSpPr>
+          <p:cNvPr id="2" name="Slide Image Placeholder 1"/>
+          <p:cNvSpPr>
+            <a:spLocks noGrp="1" noRot="1" noChangeAspect="1"/>
+          </p:cNvSpPr>
+          <p:nvPr>
+            <p:ph type="sldImg"/>
+          </p:nvPr>
+        </p:nvSpPr>
+        <p:spPr/>
+      </p:sp>
+      <p:sp>
+        <p:nvSpPr>
+          <p:cNvPr id="3" name="Notes Placeholder 2"/>
+          <p:cNvSpPr>
+            <a:spLocks noGrp="1"/>
+          </p:cNvSpPr>
+          <p:nvPr>
+            <p:ph type="body" idx="1"/>
+          </p:nvPr>
+        </p:nvSpPr>
+        <p:spPr/>
+        <p:txBody>
+          <a:bodyPr/>
+          <a:lstStyle/>
+          <a:p>
+            <a:endParaRPr lang="en-US" dirty="0"/>
+          </a:p>
+        </p:txBody>
+      </p:sp>
+      <p:sp>
+        <p:nvSpPr>
+          <p:cNvPr id="4" name="Header Placeholder 3"/>
+          <p:cNvSpPr>
+            <a:spLocks noGrp="1"/>
+          </p:cNvSpPr>
+          <p:nvPr>
+            <p:ph type="hdr" sz="quarter" idx="10"/>
+          </p:nvPr>
+        </p:nvSpPr>
+        <p:spPr/>
+        <p:txBody>
+          <a:bodyPr/>
+          <a:lstStyle/>
+          <a:p>
+            <a:endParaRPr lang="en-US"/>
+          </a:p>
+        </p:txBody>
+      </p:sp>
+      <p:sp>
+        <p:nvSpPr>
+          <p:cNvPr id="5" name="Footer Placeholder 4"/>
+          <p:cNvSpPr>
+            <a:spLocks noGrp="1"/>
+          </p:cNvSpPr>
+          <p:nvPr>
+            <p:ph type="ftr" sz="quarter" idx="11"/>
+          </p:nvPr>
+        </p:nvSpPr>
+        <p:spPr/>
+        <p:txBody>
+          <a:bodyPr/>
+          <a:lstStyle/>
+          <a:p>
+            <a:endParaRPr lang="en-US"/>
+          </a:p>
+        </p:txBody>
+      </p:sp>
+      <p:sp>
+        <p:nvSpPr>
+          <p:cNvPr id="6" name="Slide Number Placeholder 5"/>
+          <p:cNvSpPr>
+            <a:spLocks noGrp="1"/>
+          </p:cNvSpPr>
+          <p:nvPr>
+            <p:ph type="sldNum" sz="quarter" idx="12"/>
+          </p:nvPr>
+        </p:nvSpPr>
+        <p:spPr/>
+        <p:txBody>
+          <a:bodyPr/>
+          <a:lstStyle/>
+          <a:p>
+            <a:fld id="{04AFFD27-C42C-47CD-8755-C4DF35BD4C7E}" type="slidenum">
+              <a:rPr lang="en-US" smtClean="0"/>
+              <a:t>14</a:t>
+            </a:fld>
+            <a:endParaRPr lang="en-US"/>
+          </a:p>
+        </p:txBody>
+      </p:sp>
+    </p:spTree>
+    <p:extLst>
+      <p:ext uri="{BB962C8B-B14F-4D97-AF65-F5344CB8AC3E}">
+        <p14:creationId xmlns:p14="http://schemas.microsoft.com/office/powerpoint/2010/main" val="1714772350"/>
+      </p:ext>
+    </p:extLst>
+  </p:cSld>
+  <p:clrMapOvr>
+    <a:masterClrMapping/>
+  </p:clrMapOvr>
+</p:notes>
+</file>
+
+<file path=ppt/notesSlides/notesSlide15.xml><?xml version="1.0" encoding="utf-8"?>
+<p:notes xmlns:a="http://schemas.openxmlformats.org/drawingml/2006/main" xmlns:r="http://schemas.openxmlformats.org/officeDocument/2006/relationships" xmlns:p="http://schemas.openxmlformats.org/presentationml/2006/main">
+  <p:cSld>
+    <p:spTree>
+      <p:nvGrpSpPr>
+        <p:cNvPr id="1" name=""/>
+        <p:cNvGrpSpPr/>
+        <p:nvPr/>
+      </p:nvGrpSpPr>
+      <p:grpSpPr>
+        <a:xfrm>
+          <a:off x="0" y="0"/>
+          <a:ext cx="0" cy="0"/>
+          <a:chOff x="0" y="0"/>
+          <a:chExt cx="0" cy="0"/>
+        </a:xfrm>
+      </p:grpSpPr>
+      <p:sp>
+        <p:nvSpPr>
+          <p:cNvPr id="2" name="Slide Image Placeholder 1"/>
+          <p:cNvSpPr>
+            <a:spLocks noGrp="1" noRot="1" noChangeAspect="1"/>
+          </p:cNvSpPr>
+          <p:nvPr>
+            <p:ph type="sldImg"/>
+          </p:nvPr>
+        </p:nvSpPr>
+        <p:spPr/>
+      </p:sp>
+      <p:sp>
+        <p:nvSpPr>
+          <p:cNvPr id="3" name="Notes Placeholder 2"/>
+          <p:cNvSpPr>
+            <a:spLocks noGrp="1"/>
+          </p:cNvSpPr>
+          <p:nvPr>
+            <p:ph type="body" idx="1"/>
+          </p:nvPr>
+        </p:nvSpPr>
+        <p:spPr/>
+        <p:txBody>
+          <a:bodyPr/>
+          <a:lstStyle/>
+          <a:p>
+            <a:endParaRPr lang="en-US" dirty="0"/>
+          </a:p>
+        </p:txBody>
+      </p:sp>
+      <p:sp>
+        <p:nvSpPr>
+          <p:cNvPr id="4" name="Header Placeholder 3"/>
+          <p:cNvSpPr>
+            <a:spLocks noGrp="1"/>
+          </p:cNvSpPr>
+          <p:nvPr>
+            <p:ph type="hdr" sz="quarter" idx="10"/>
+          </p:nvPr>
+        </p:nvSpPr>
+        <p:spPr/>
+        <p:txBody>
+          <a:bodyPr/>
+          <a:lstStyle/>
+          <a:p>
+            <a:endParaRPr lang="en-US"/>
+          </a:p>
+        </p:txBody>
+      </p:sp>
+      <p:sp>
+        <p:nvSpPr>
+          <p:cNvPr id="5" name="Footer Placeholder 4"/>
+          <p:cNvSpPr>
+            <a:spLocks noGrp="1"/>
+          </p:cNvSpPr>
+          <p:nvPr>
+            <p:ph type="ftr" sz="quarter" idx="11"/>
+          </p:nvPr>
+        </p:nvSpPr>
+        <p:spPr/>
+        <p:txBody>
+          <a:bodyPr/>
+          <a:lstStyle/>
+          <a:p>
+            <a:endParaRPr lang="en-US"/>
+          </a:p>
+        </p:txBody>
+      </p:sp>
+      <p:sp>
+        <p:nvSpPr>
+          <p:cNvPr id="6" name="Slide Number Placeholder 5"/>
+          <p:cNvSpPr>
+            <a:spLocks noGrp="1"/>
+          </p:cNvSpPr>
+          <p:nvPr>
+            <p:ph type="sldNum" sz="quarter" idx="12"/>
+          </p:nvPr>
+        </p:nvSpPr>
+        <p:spPr/>
+        <p:txBody>
+          <a:bodyPr/>
+          <a:lstStyle/>
+          <a:p>
+            <a:fld id="{04AFFD27-C42C-47CD-8755-C4DF35BD4C7E}" type="slidenum">
+              <a:rPr lang="en-US" smtClean="0"/>
+              <a:t>15</a:t>
+            </a:fld>
+            <a:endParaRPr lang="en-US"/>
+          </a:p>
+        </p:txBody>
+      </p:sp>
+    </p:spTree>
+    <p:extLst>
+      <p:ext uri="{BB962C8B-B14F-4D97-AF65-F5344CB8AC3E}">
         <p14:creationId xmlns:p14="http://schemas.microsoft.com/office/powerpoint/2010/main" val="4211785599"/>
+      </p:ext>
+    </p:extLst>
+  </p:cSld>
+  <p:clrMapOvr>
+    <a:masterClrMapping/>
+  </p:clrMapOvr>
+</p:notes>
+</file>
+
+<file path=ppt/notesSlides/notesSlide16.xml><?xml version="1.0" encoding="utf-8"?>
+<p:notes xmlns:a="http://schemas.openxmlformats.org/drawingml/2006/main" xmlns:r="http://schemas.openxmlformats.org/officeDocument/2006/relationships" xmlns:p="http://schemas.openxmlformats.org/presentationml/2006/main">
+  <p:cSld>
+    <p:spTree>
+      <p:nvGrpSpPr>
+        <p:cNvPr id="1" name=""/>
+        <p:cNvGrpSpPr/>
+        <p:nvPr/>
+      </p:nvGrpSpPr>
+      <p:grpSpPr>
+        <a:xfrm>
+          <a:off x="0" y="0"/>
+          <a:ext cx="0" cy="0"/>
+          <a:chOff x="0" y="0"/>
+          <a:chExt cx="0" cy="0"/>
+        </a:xfrm>
+      </p:grpSpPr>
+      <p:sp>
+        <p:nvSpPr>
+          <p:cNvPr id="2" name="Slide Image Placeholder 1"/>
+          <p:cNvSpPr>
+            <a:spLocks noGrp="1" noRot="1" noChangeAspect="1"/>
+          </p:cNvSpPr>
+          <p:nvPr>
+            <p:ph type="sldImg"/>
+          </p:nvPr>
+        </p:nvSpPr>
+        <p:spPr/>
+      </p:sp>
+      <p:sp>
+        <p:nvSpPr>
+          <p:cNvPr id="3" name="Notes Placeholder 2"/>
+          <p:cNvSpPr>
+            <a:spLocks noGrp="1"/>
+          </p:cNvSpPr>
+          <p:nvPr>
+            <p:ph type="body" idx="1"/>
+          </p:nvPr>
+        </p:nvSpPr>
+        <p:spPr/>
+        <p:txBody>
+          <a:bodyPr/>
+          <a:lstStyle/>
+          <a:p>
+            <a:endParaRPr lang="en-US" dirty="0"/>
+          </a:p>
+        </p:txBody>
+      </p:sp>
+      <p:sp>
+        <p:nvSpPr>
+          <p:cNvPr id="4" name="Header Placeholder 3"/>
+          <p:cNvSpPr>
+            <a:spLocks noGrp="1"/>
+          </p:cNvSpPr>
+          <p:nvPr>
+            <p:ph type="hdr" sz="quarter" idx="10"/>
+          </p:nvPr>
+        </p:nvSpPr>
+        <p:spPr/>
+        <p:txBody>
+          <a:bodyPr/>
+          <a:lstStyle/>
+          <a:p>
+            <a:endParaRPr lang="en-US"/>
+          </a:p>
+        </p:txBody>
+      </p:sp>
+      <p:sp>
+        <p:nvSpPr>
+          <p:cNvPr id="5" name="Footer Placeholder 4"/>
+          <p:cNvSpPr>
+            <a:spLocks noGrp="1"/>
+          </p:cNvSpPr>
+          <p:nvPr>
+            <p:ph type="ftr" sz="quarter" idx="11"/>
+          </p:nvPr>
+        </p:nvSpPr>
+        <p:spPr/>
+        <p:txBody>
+          <a:bodyPr/>
+          <a:lstStyle/>
+          <a:p>
+            <a:endParaRPr lang="en-US"/>
+          </a:p>
+        </p:txBody>
+      </p:sp>
+      <p:sp>
+        <p:nvSpPr>
+          <p:cNvPr id="6" name="Slide Number Placeholder 5"/>
+          <p:cNvSpPr>
+            <a:spLocks noGrp="1"/>
+          </p:cNvSpPr>
+          <p:nvPr>
+            <p:ph type="sldNum" sz="quarter" idx="12"/>
+          </p:nvPr>
+        </p:nvSpPr>
+        <p:spPr/>
+        <p:txBody>
+          <a:bodyPr/>
+          <a:lstStyle/>
+          <a:p>
+            <a:fld id="{04AFFD27-C42C-47CD-8755-C4DF35BD4C7E}" type="slidenum">
+              <a:rPr lang="en-US" smtClean="0"/>
+              <a:t>16</a:t>
+            </a:fld>
+            <a:endParaRPr lang="en-US"/>
+          </a:p>
+        </p:txBody>
+      </p:sp>
+    </p:spTree>
+    <p:extLst>
+      <p:ext uri="{BB962C8B-B14F-4D97-AF65-F5344CB8AC3E}">
+        <p14:creationId xmlns:p14="http://schemas.microsoft.com/office/powerpoint/2010/main" val="832951166"/>
+      </p:ext>
+    </p:extLst>
+  </p:cSld>
+  <p:clrMapOvr>
+    <a:masterClrMapping/>
+  </p:clrMapOvr>
+</p:notes>
+</file>
+
+<file path=ppt/notesSlides/notesSlide17.xml><?xml version="1.0" encoding="utf-8"?>
+<p:notes xmlns:a="http://schemas.openxmlformats.org/drawingml/2006/main" xmlns:r="http://schemas.openxmlformats.org/officeDocument/2006/relationships" xmlns:p="http://schemas.openxmlformats.org/presentationml/2006/main">
+  <p:cSld>
+    <p:spTree>
+      <p:nvGrpSpPr>
+        <p:cNvPr id="1" name=""/>
+        <p:cNvGrpSpPr/>
+        <p:nvPr/>
+      </p:nvGrpSpPr>
+      <p:grpSpPr>
+        <a:xfrm>
+          <a:off x="0" y="0"/>
+          <a:ext cx="0" cy="0"/>
+          <a:chOff x="0" y="0"/>
+          <a:chExt cx="0" cy="0"/>
+        </a:xfrm>
+      </p:grpSpPr>
+      <p:sp>
+        <p:nvSpPr>
+          <p:cNvPr id="2" name="Slide Image Placeholder 1"/>
+          <p:cNvSpPr>
+            <a:spLocks noGrp="1" noRot="1" noChangeAspect="1"/>
+          </p:cNvSpPr>
+          <p:nvPr>
+            <p:ph type="sldImg"/>
+          </p:nvPr>
+        </p:nvSpPr>
+        <p:spPr/>
+      </p:sp>
+      <p:sp>
+        <p:nvSpPr>
+          <p:cNvPr id="3" name="Notes Placeholder 2"/>
+          <p:cNvSpPr>
+            <a:spLocks noGrp="1"/>
+          </p:cNvSpPr>
+          <p:nvPr>
+            <p:ph type="body" idx="1"/>
+          </p:nvPr>
+        </p:nvSpPr>
+        <p:spPr/>
+        <p:txBody>
+          <a:bodyPr/>
+          <a:lstStyle/>
+          <a:p>
+            <a:endParaRPr lang="en-US" dirty="0"/>
+          </a:p>
+        </p:txBody>
+      </p:sp>
+      <p:sp>
+        <p:nvSpPr>
+          <p:cNvPr id="4" name="Header Placeholder 3"/>
+          <p:cNvSpPr>
+            <a:spLocks noGrp="1"/>
+          </p:cNvSpPr>
+          <p:nvPr>
+            <p:ph type="hdr" sz="quarter" idx="10"/>
+          </p:nvPr>
+        </p:nvSpPr>
+        <p:spPr/>
+        <p:txBody>
+          <a:bodyPr/>
+          <a:lstStyle/>
+          <a:p>
+            <a:endParaRPr lang="en-US"/>
+          </a:p>
+        </p:txBody>
+      </p:sp>
+      <p:sp>
+        <p:nvSpPr>
+          <p:cNvPr id="5" name="Footer Placeholder 4"/>
+          <p:cNvSpPr>
+            <a:spLocks noGrp="1"/>
+          </p:cNvSpPr>
+          <p:nvPr>
+            <p:ph type="ftr" sz="quarter" idx="11"/>
+          </p:nvPr>
+        </p:nvSpPr>
+        <p:spPr/>
+        <p:txBody>
+          <a:bodyPr/>
+          <a:lstStyle/>
+          <a:p>
+            <a:endParaRPr lang="en-US"/>
+          </a:p>
+        </p:txBody>
+      </p:sp>
+      <p:sp>
+        <p:nvSpPr>
+          <p:cNvPr id="6" name="Slide Number Placeholder 5"/>
+          <p:cNvSpPr>
+            <a:spLocks noGrp="1"/>
+          </p:cNvSpPr>
+          <p:nvPr>
+            <p:ph type="sldNum" sz="quarter" idx="12"/>
+          </p:nvPr>
+        </p:nvSpPr>
+        <p:spPr/>
+        <p:txBody>
+          <a:bodyPr/>
+          <a:lstStyle/>
+          <a:p>
+            <a:fld id="{04AFFD27-C42C-47CD-8755-C4DF35BD4C7E}" type="slidenum">
+              <a:rPr lang="en-US" smtClean="0"/>
+              <a:t>17</a:t>
+            </a:fld>
+            <a:endParaRPr lang="en-US"/>
+          </a:p>
+        </p:txBody>
+      </p:sp>
+    </p:spTree>
+    <p:extLst>
+      <p:ext uri="{BB962C8B-B14F-4D97-AF65-F5344CB8AC3E}">
+        <p14:creationId xmlns:p14="http://schemas.microsoft.com/office/powerpoint/2010/main" val="1707925867"/>
+      </p:ext>
+    </p:extLst>
+  </p:cSld>
+  <p:clrMapOvr>
+    <a:masterClrMapping/>
+  </p:clrMapOvr>
+</p:notes>
+</file>
+
+<file path=ppt/notesSlides/notesSlide18.xml><?xml version="1.0" encoding="utf-8"?>
+<p:notes xmlns:a="http://schemas.openxmlformats.org/drawingml/2006/main" xmlns:r="http://schemas.openxmlformats.org/officeDocument/2006/relationships" xmlns:p="http://schemas.openxmlformats.org/presentationml/2006/main">
+  <p:cSld>
+    <p:spTree>
+      <p:nvGrpSpPr>
+        <p:cNvPr id="1" name=""/>
+        <p:cNvGrpSpPr/>
+        <p:nvPr/>
+      </p:nvGrpSpPr>
+      <p:grpSpPr>
+        <a:xfrm>
+          <a:off x="0" y="0"/>
+          <a:ext cx="0" cy="0"/>
+          <a:chOff x="0" y="0"/>
+          <a:chExt cx="0" cy="0"/>
+        </a:xfrm>
+      </p:grpSpPr>
+      <p:sp>
+        <p:nvSpPr>
+          <p:cNvPr id="2" name="Slide Image Placeholder 1"/>
+          <p:cNvSpPr>
+            <a:spLocks noGrp="1" noRot="1" noChangeAspect="1"/>
+          </p:cNvSpPr>
+          <p:nvPr>
+            <p:ph type="sldImg"/>
+          </p:nvPr>
+        </p:nvSpPr>
+        <p:spPr/>
+      </p:sp>
+      <p:sp>
+        <p:nvSpPr>
+          <p:cNvPr id="3" name="Notes Placeholder 2"/>
+          <p:cNvSpPr>
+            <a:spLocks noGrp="1"/>
+          </p:cNvSpPr>
+          <p:nvPr>
+            <p:ph type="body" idx="1"/>
+          </p:nvPr>
+        </p:nvSpPr>
+        <p:spPr/>
+        <p:txBody>
+          <a:bodyPr/>
+          <a:lstStyle/>
+          <a:p>
+            <a:endParaRPr lang="en-US" dirty="0"/>
+          </a:p>
+        </p:txBody>
+      </p:sp>
+      <p:sp>
+        <p:nvSpPr>
+          <p:cNvPr id="4" name="Header Placeholder 3"/>
+          <p:cNvSpPr>
+            <a:spLocks noGrp="1"/>
+          </p:cNvSpPr>
+          <p:nvPr>
+            <p:ph type="hdr" sz="quarter" idx="10"/>
+          </p:nvPr>
+        </p:nvSpPr>
+        <p:spPr/>
+        <p:txBody>
+          <a:bodyPr/>
+          <a:lstStyle/>
+          <a:p>
+            <a:endParaRPr lang="en-US"/>
+          </a:p>
+        </p:txBody>
+      </p:sp>
+      <p:sp>
+        <p:nvSpPr>
+          <p:cNvPr id="5" name="Footer Placeholder 4"/>
+          <p:cNvSpPr>
+            <a:spLocks noGrp="1"/>
+          </p:cNvSpPr>
+          <p:nvPr>
+            <p:ph type="ftr" sz="quarter" idx="11"/>
+          </p:nvPr>
+        </p:nvSpPr>
+        <p:spPr/>
+        <p:txBody>
+          <a:bodyPr/>
+          <a:lstStyle/>
+          <a:p>
+            <a:endParaRPr lang="en-US"/>
+          </a:p>
+        </p:txBody>
+      </p:sp>
+      <p:sp>
+        <p:nvSpPr>
+          <p:cNvPr id="6" name="Slide Number Placeholder 5"/>
+          <p:cNvSpPr>
+            <a:spLocks noGrp="1"/>
+          </p:cNvSpPr>
+          <p:nvPr>
+            <p:ph type="sldNum" sz="quarter" idx="12"/>
+          </p:nvPr>
+        </p:nvSpPr>
+        <p:spPr/>
+        <p:txBody>
+          <a:bodyPr/>
+          <a:lstStyle/>
+          <a:p>
+            <a:fld id="{04AFFD27-C42C-47CD-8755-C4DF35BD4C7E}" type="slidenum">
+              <a:rPr lang="en-US" smtClean="0"/>
+              <a:t>18</a:t>
+            </a:fld>
+            <a:endParaRPr lang="en-US"/>
+          </a:p>
+        </p:txBody>
+      </p:sp>
+    </p:spTree>
+    <p:extLst>
+      <p:ext uri="{BB962C8B-B14F-4D97-AF65-F5344CB8AC3E}">
+        <p14:creationId xmlns:p14="http://schemas.microsoft.com/office/powerpoint/2010/main" val="1950293259"/>
       </p:ext>
     </p:extLst>
   </p:cSld>
@@ -1728,7 +2471,7 @@
     </p:spTree>
     <p:extLst>
       <p:ext uri="{BB962C8B-B14F-4D97-AF65-F5344CB8AC3E}">
-        <p14:creationId xmlns:p14="http://schemas.microsoft.com/office/powerpoint/2010/main" val="3125904450"/>
+        <p14:creationId xmlns:p14="http://schemas.microsoft.com/office/powerpoint/2010/main" val="2321564984"/>
       </p:ext>
     </p:extLst>
   </p:cSld>
@@ -1850,7 +2593,7 @@
     </p:spTree>
     <p:extLst>
       <p:ext uri="{BB962C8B-B14F-4D97-AF65-F5344CB8AC3E}">
-        <p14:creationId xmlns:p14="http://schemas.microsoft.com/office/powerpoint/2010/main" val="2321564984"/>
+        <p14:creationId xmlns:p14="http://schemas.microsoft.com/office/powerpoint/2010/main" val="1047188487"/>
       </p:ext>
     </p:extLst>
   </p:cSld>
@@ -1972,7 +2715,7 @@
     </p:spTree>
     <p:extLst>
       <p:ext uri="{BB962C8B-B14F-4D97-AF65-F5344CB8AC3E}">
-        <p14:creationId xmlns:p14="http://schemas.microsoft.com/office/powerpoint/2010/main" val="1047188487"/>
+        <p14:creationId xmlns:p14="http://schemas.microsoft.com/office/powerpoint/2010/main" val="3762035539"/>
       </p:ext>
     </p:extLst>
   </p:cSld>
@@ -2161,7 +2904,7 @@
           <a:noFill/>
           <a:extLst>
             <a:ext uri="{909E8E84-426E-40dd-AFC4-6F175D3DCCD1}">
-              <a14:hiddenFill xmlns:a14="http://schemas.microsoft.com/office/drawing/2010/main" xmlns="">
+              <a14:hiddenFill xmlns="" xmlns:a14="http://schemas.microsoft.com/office/drawing/2010/main">
                 <a:solidFill>
                   <a:srgbClr val="FFFFFF"/>
                 </a:solidFill>
@@ -2220,7 +2963,7 @@
             </a:ln>
             <a:extLst>
               <a:ext uri="{91240B29-F687-4f45-9708-019B960494DF}">
-                <a14:hiddenLine xmlns:a14="http://schemas.microsoft.com/office/drawing/2010/main" xmlns="" w="9525">
+                <a14:hiddenLine xmlns="" xmlns:a14="http://schemas.microsoft.com/office/drawing/2010/main" w="9525">
                   <a:solidFill>
                     <a:srgbClr val="000000"/>
                   </a:solidFill>
@@ -2310,7 +3053,7 @@
             </a:ln>
             <a:extLst>
               <a:ext uri="{91240B29-F687-4f45-9708-019B960494DF}">
-                <a14:hiddenLine xmlns:a14="http://schemas.microsoft.com/office/drawing/2010/main" xmlns="" w="9525">
+                <a14:hiddenLine xmlns="" xmlns:a14="http://schemas.microsoft.com/office/drawing/2010/main" w="9525">
                   <a:solidFill>
                     <a:srgbClr val="000000"/>
                   </a:solidFill>
@@ -2400,7 +3143,7 @@
             </a:ln>
             <a:extLst>
               <a:ext uri="{91240B29-F687-4f45-9708-019B960494DF}">
-                <a14:hiddenLine xmlns:a14="http://schemas.microsoft.com/office/drawing/2010/main" xmlns="" w="9525">
+                <a14:hiddenLine xmlns="" xmlns:a14="http://schemas.microsoft.com/office/drawing/2010/main" w="9525">
                   <a:solidFill>
                     <a:srgbClr val="000000"/>
                   </a:solidFill>
@@ -2434,7 +3177,7 @@
             </a:ln>
             <a:extLst>
               <a:ext uri="{91240B29-F687-4f45-9708-019B960494DF}">
-                <a14:hiddenLine xmlns:a14="http://schemas.microsoft.com/office/drawing/2010/main" xmlns="" w="9525">
+                <a14:hiddenLine xmlns="" xmlns:a14="http://schemas.microsoft.com/office/drawing/2010/main" w="9525">
                   <a:solidFill>
                     <a:srgbClr val="000000"/>
                   </a:solidFill>
@@ -2524,7 +3267,7 @@
             </a:ln>
             <a:extLst>
               <a:ext uri="{91240B29-F687-4f45-9708-019B960494DF}">
-                <a14:hiddenLine xmlns:a14="http://schemas.microsoft.com/office/drawing/2010/main" xmlns="" w="9525">
+                <a14:hiddenLine xmlns="" xmlns:a14="http://schemas.microsoft.com/office/drawing/2010/main" w="9525">
                   <a:solidFill>
                     <a:srgbClr val="000000"/>
                   </a:solidFill>
@@ -2586,7 +3329,7 @@
             </a:ln>
             <a:extLst>
               <a:ext uri="{91240B29-F687-4f45-9708-019B960494DF}">
-                <a14:hiddenLine xmlns:a14="http://schemas.microsoft.com/office/drawing/2010/main" xmlns="" w="9525">
+                <a14:hiddenLine xmlns="" xmlns:a14="http://schemas.microsoft.com/office/drawing/2010/main" w="9525">
                   <a:solidFill>
                     <a:srgbClr val="000000"/>
                   </a:solidFill>
@@ -2648,7 +3391,7 @@
             </a:ln>
             <a:extLst>
               <a:ext uri="{91240B29-F687-4f45-9708-019B960494DF}">
-                <a14:hiddenLine xmlns:a14="http://schemas.microsoft.com/office/drawing/2010/main" xmlns="" w="9525">
+                <a14:hiddenLine xmlns="" xmlns:a14="http://schemas.microsoft.com/office/drawing/2010/main" w="9525">
                   <a:solidFill>
                     <a:srgbClr val="000000"/>
                   </a:solidFill>
@@ -2738,7 +3481,7 @@
             </a:ln>
             <a:extLst>
               <a:ext uri="{91240B29-F687-4f45-9708-019B960494DF}">
-                <a14:hiddenLine xmlns:a14="http://schemas.microsoft.com/office/drawing/2010/main" xmlns="" w="9525">
+                <a14:hiddenLine xmlns="" xmlns:a14="http://schemas.microsoft.com/office/drawing/2010/main" w="9525">
                   <a:solidFill>
                     <a:srgbClr val="000000"/>
                   </a:solidFill>
@@ -2800,7 +3543,7 @@
             </a:ln>
             <a:extLst>
               <a:ext uri="{91240B29-F687-4f45-9708-019B960494DF}">
-                <a14:hiddenLine xmlns:a14="http://schemas.microsoft.com/office/drawing/2010/main" xmlns="" w="9525">
+                <a14:hiddenLine xmlns="" xmlns:a14="http://schemas.microsoft.com/office/drawing/2010/main" w="9525">
                   <a:solidFill>
                     <a:srgbClr val="000000"/>
                   </a:solidFill>
@@ -2862,7 +3605,7 @@
             </a:ln>
             <a:extLst>
               <a:ext uri="{91240B29-F687-4f45-9708-019B960494DF}">
-                <a14:hiddenLine xmlns:a14="http://schemas.microsoft.com/office/drawing/2010/main" xmlns="" w="9525">
+                <a14:hiddenLine xmlns="" xmlns:a14="http://schemas.microsoft.com/office/drawing/2010/main" w="9525">
                   <a:solidFill>
                     <a:srgbClr val="000000"/>
                   </a:solidFill>
@@ -2952,7 +3695,7 @@
             </a:ln>
             <a:extLst>
               <a:ext uri="{91240B29-F687-4f45-9708-019B960494DF}">
-                <a14:hiddenLine xmlns:a14="http://schemas.microsoft.com/office/drawing/2010/main" xmlns="" w="9525">
+                <a14:hiddenLine xmlns="" xmlns:a14="http://schemas.microsoft.com/office/drawing/2010/main" w="9525">
                   <a:solidFill>
                     <a:srgbClr val="000000"/>
                   </a:solidFill>
@@ -3042,7 +3785,7 @@
             </a:ln>
             <a:extLst>
               <a:ext uri="{91240B29-F687-4f45-9708-019B960494DF}">
-                <a14:hiddenLine xmlns:a14="http://schemas.microsoft.com/office/drawing/2010/main" xmlns="" w="9525">
+                <a14:hiddenLine xmlns="" xmlns:a14="http://schemas.microsoft.com/office/drawing/2010/main" w="9525">
                   <a:solidFill>
                     <a:srgbClr val="000000"/>
                   </a:solidFill>
@@ -3104,7 +3847,7 @@
             </a:ln>
             <a:extLst>
               <a:ext uri="{91240B29-F687-4f45-9708-019B960494DF}">
-                <a14:hiddenLine xmlns:a14="http://schemas.microsoft.com/office/drawing/2010/main" xmlns="" w="9525">
+                <a14:hiddenLine xmlns="" xmlns:a14="http://schemas.microsoft.com/office/drawing/2010/main" w="9525">
                   <a:solidFill>
                     <a:srgbClr val="000000"/>
                   </a:solidFill>
@@ -3214,7 +3957,7 @@
             </a:ln>
             <a:extLst>
               <a:ext uri="{91240B29-F687-4f45-9708-019B960494DF}">
-                <a14:hiddenLine xmlns:a14="http://schemas.microsoft.com/office/drawing/2010/main" xmlns="" w="9525">
+                <a14:hiddenLine xmlns="" xmlns:a14="http://schemas.microsoft.com/office/drawing/2010/main" w="9525">
                   <a:solidFill>
                     <a:srgbClr val="000000"/>
                   </a:solidFill>
@@ -3276,7 +4019,7 @@
             </a:ln>
             <a:extLst>
               <a:ext uri="{91240B29-F687-4f45-9708-019B960494DF}">
-                <a14:hiddenLine xmlns:a14="http://schemas.microsoft.com/office/drawing/2010/main" xmlns="" w="9525">
+                <a14:hiddenLine xmlns="" xmlns:a14="http://schemas.microsoft.com/office/drawing/2010/main" w="9525">
                   <a:solidFill>
                     <a:srgbClr val="000000"/>
                   </a:solidFill>
@@ -3366,7 +4109,7 @@
             </a:ln>
             <a:extLst>
               <a:ext uri="{91240B29-F687-4f45-9708-019B960494DF}">
-                <a14:hiddenLine xmlns:a14="http://schemas.microsoft.com/office/drawing/2010/main" xmlns="" w="9525">
+                <a14:hiddenLine xmlns="" xmlns:a14="http://schemas.microsoft.com/office/drawing/2010/main" w="9525">
                   <a:solidFill>
                     <a:srgbClr val="000000"/>
                   </a:solidFill>
@@ -3456,7 +4199,7 @@
             </a:ln>
             <a:extLst>
               <a:ext uri="{91240B29-F687-4f45-9708-019B960494DF}">
-                <a14:hiddenLine xmlns:a14="http://schemas.microsoft.com/office/drawing/2010/main" xmlns="" w="9525">
+                <a14:hiddenLine xmlns="" xmlns:a14="http://schemas.microsoft.com/office/drawing/2010/main" w="9525">
                   <a:solidFill>
                     <a:srgbClr val="000000"/>
                   </a:solidFill>
@@ -3518,7 +4261,7 @@
             </a:ln>
             <a:extLst>
               <a:ext uri="{91240B29-F687-4f45-9708-019B960494DF}">
-                <a14:hiddenLine xmlns:a14="http://schemas.microsoft.com/office/drawing/2010/main" xmlns="" w="9525">
+                <a14:hiddenLine xmlns="" xmlns:a14="http://schemas.microsoft.com/office/drawing/2010/main" w="9525">
                   <a:solidFill>
                     <a:srgbClr val="000000"/>
                   </a:solidFill>
@@ -3608,7 +4351,7 @@
             </a:ln>
             <a:extLst>
               <a:ext uri="{91240B29-F687-4f45-9708-019B960494DF}">
-                <a14:hiddenLine xmlns:a14="http://schemas.microsoft.com/office/drawing/2010/main" xmlns="" w="9525">
+                <a14:hiddenLine xmlns="" xmlns:a14="http://schemas.microsoft.com/office/drawing/2010/main" w="9525">
                   <a:solidFill>
                     <a:srgbClr val="000000"/>
                   </a:solidFill>
@@ -3698,7 +4441,7 @@
             </a:ln>
             <a:extLst>
               <a:ext uri="{91240B29-F687-4f45-9708-019B960494DF}">
-                <a14:hiddenLine xmlns:a14="http://schemas.microsoft.com/office/drawing/2010/main" xmlns="" w="9525">
+                <a14:hiddenLine xmlns="" xmlns:a14="http://schemas.microsoft.com/office/drawing/2010/main" w="9525">
                   <a:solidFill>
                     <a:srgbClr val="000000"/>
                   </a:solidFill>
@@ -3754,7 +4497,7 @@
             </a:ln>
             <a:extLst>
               <a:ext uri="{91240B29-F687-4f45-9708-019B960494DF}">
-                <a14:hiddenLine xmlns:a14="http://schemas.microsoft.com/office/drawing/2010/main" xmlns="" w="9525">
+                <a14:hiddenLine xmlns="" xmlns:a14="http://schemas.microsoft.com/office/drawing/2010/main" w="9525">
                   <a:solidFill>
                     <a:srgbClr val="000000"/>
                   </a:solidFill>
@@ -3844,7 +4587,7 @@
             </a:ln>
             <a:extLst>
               <a:ext uri="{91240B29-F687-4f45-9708-019B960494DF}">
-                <a14:hiddenLine xmlns:a14="http://schemas.microsoft.com/office/drawing/2010/main" xmlns="" w="9525">
+                <a14:hiddenLine xmlns="" xmlns:a14="http://schemas.microsoft.com/office/drawing/2010/main" w="9525">
                   <a:solidFill>
                     <a:srgbClr val="000000"/>
                   </a:solidFill>
@@ -3900,7 +4643,7 @@
             </a:ln>
             <a:extLst>
               <a:ext uri="{91240B29-F687-4f45-9708-019B960494DF}">
-                <a14:hiddenLine xmlns:a14="http://schemas.microsoft.com/office/drawing/2010/main" xmlns="" w="9525">
+                <a14:hiddenLine xmlns="" xmlns:a14="http://schemas.microsoft.com/office/drawing/2010/main" w="9525">
                   <a:solidFill>
                     <a:srgbClr val="000000"/>
                   </a:solidFill>
@@ -3990,7 +4733,7 @@
             </a:ln>
             <a:extLst>
               <a:ext uri="{91240B29-F687-4f45-9708-019B960494DF}">
-                <a14:hiddenLine xmlns:a14="http://schemas.microsoft.com/office/drawing/2010/main" xmlns="" w="9525">
+                <a14:hiddenLine xmlns="" xmlns:a14="http://schemas.microsoft.com/office/drawing/2010/main" w="9525">
                   <a:solidFill>
                     <a:srgbClr val="000000"/>
                   </a:solidFill>
@@ -4058,7 +4801,7 @@
             </a:ln>
             <a:extLst>
               <a:ext uri="{91240B29-F687-4f45-9708-019B960494DF}">
-                <a14:hiddenLine xmlns:a14="http://schemas.microsoft.com/office/drawing/2010/main" xmlns="" w="9525">
+                <a14:hiddenLine xmlns="" xmlns:a14="http://schemas.microsoft.com/office/drawing/2010/main" w="9525">
                   <a:solidFill>
                     <a:srgbClr val="000000"/>
                   </a:solidFill>
@@ -4148,7 +4891,7 @@
             </a:ln>
             <a:extLst>
               <a:ext uri="{91240B29-F687-4f45-9708-019B960494DF}">
-                <a14:hiddenLine xmlns:a14="http://schemas.microsoft.com/office/drawing/2010/main" xmlns="" w="9525">
+                <a14:hiddenLine xmlns="" xmlns:a14="http://schemas.microsoft.com/office/drawing/2010/main" w="9525">
                   <a:solidFill>
                     <a:srgbClr val="000000"/>
                   </a:solidFill>
@@ -4216,7 +4959,7 @@
             </a:ln>
             <a:extLst>
               <a:ext uri="{91240B29-F687-4f45-9708-019B960494DF}">
-                <a14:hiddenLine xmlns:a14="http://schemas.microsoft.com/office/drawing/2010/main" xmlns="" w="9525">
+                <a14:hiddenLine xmlns="" xmlns:a14="http://schemas.microsoft.com/office/drawing/2010/main" w="9525">
                   <a:solidFill>
                     <a:srgbClr val="000000"/>
                   </a:solidFill>
@@ -4306,7 +5049,7 @@
             </a:ln>
             <a:extLst>
               <a:ext uri="{91240B29-F687-4f45-9708-019B960494DF}">
-                <a14:hiddenLine xmlns:a14="http://schemas.microsoft.com/office/drawing/2010/main" xmlns="" w="9525">
+                <a14:hiddenLine xmlns="" xmlns:a14="http://schemas.microsoft.com/office/drawing/2010/main" w="9525">
                   <a:solidFill>
                     <a:srgbClr val="000000"/>
                   </a:solidFill>
@@ -4340,7 +5083,7 @@
             </a:ln>
             <a:extLst>
               <a:ext uri="{91240B29-F687-4f45-9708-019B960494DF}">
-                <a14:hiddenLine xmlns:a14="http://schemas.microsoft.com/office/drawing/2010/main" xmlns="" w="9525">
+                <a14:hiddenLine xmlns="" xmlns:a14="http://schemas.microsoft.com/office/drawing/2010/main" w="9525">
                   <a:solidFill>
                     <a:srgbClr val="000000"/>
                   </a:solidFill>
@@ -4430,7 +5173,7 @@
             </a:ln>
             <a:extLst>
               <a:ext uri="{91240B29-F687-4f45-9708-019B960494DF}">
-                <a14:hiddenLine xmlns:a14="http://schemas.microsoft.com/office/drawing/2010/main" xmlns="" w="9525">
+                <a14:hiddenLine xmlns="" xmlns:a14="http://schemas.microsoft.com/office/drawing/2010/main" w="9525">
                   <a:solidFill>
                     <a:srgbClr val="000000"/>
                   </a:solidFill>
@@ -4492,7 +5235,7 @@
             </a:ln>
             <a:extLst>
               <a:ext uri="{91240B29-F687-4f45-9708-019B960494DF}">
-                <a14:hiddenLine xmlns:a14="http://schemas.microsoft.com/office/drawing/2010/main" xmlns="" w="9525">
+                <a14:hiddenLine xmlns="" xmlns:a14="http://schemas.microsoft.com/office/drawing/2010/main" w="9525">
                   <a:solidFill>
                     <a:srgbClr val="000000"/>
                   </a:solidFill>
@@ -4554,7 +5297,7 @@
             </a:ln>
             <a:extLst>
               <a:ext uri="{91240B29-F687-4f45-9708-019B960494DF}">
-                <a14:hiddenLine xmlns:a14="http://schemas.microsoft.com/office/drawing/2010/main" xmlns="" w="9525">
+                <a14:hiddenLine xmlns="" xmlns:a14="http://schemas.microsoft.com/office/drawing/2010/main" w="9525">
                   <a:solidFill>
                     <a:srgbClr val="000000"/>
                   </a:solidFill>
@@ -4644,7 +5387,7 @@
             </a:ln>
             <a:extLst>
               <a:ext uri="{91240B29-F687-4f45-9708-019B960494DF}">
-                <a14:hiddenLine xmlns:a14="http://schemas.microsoft.com/office/drawing/2010/main" xmlns="" w="9525">
+                <a14:hiddenLine xmlns="" xmlns:a14="http://schemas.microsoft.com/office/drawing/2010/main" w="9525">
                   <a:solidFill>
                     <a:srgbClr val="000000"/>
                   </a:solidFill>
@@ -4712,7 +5455,7 @@
             </a:ln>
             <a:extLst>
               <a:ext uri="{91240B29-F687-4f45-9708-019B960494DF}">
-                <a14:hiddenLine xmlns:a14="http://schemas.microsoft.com/office/drawing/2010/main" xmlns="" w="9525">
+                <a14:hiddenLine xmlns="" xmlns:a14="http://schemas.microsoft.com/office/drawing/2010/main" w="9525">
                   <a:solidFill>
                     <a:srgbClr val="000000"/>
                   </a:solidFill>
@@ -4774,7 +5517,7 @@
             </a:ln>
             <a:extLst>
               <a:ext uri="{91240B29-F687-4f45-9708-019B960494DF}">
-                <a14:hiddenLine xmlns:a14="http://schemas.microsoft.com/office/drawing/2010/main" xmlns="" w="9525">
+                <a14:hiddenLine xmlns="" xmlns:a14="http://schemas.microsoft.com/office/drawing/2010/main" w="9525">
                   <a:solidFill>
                     <a:srgbClr val="000000"/>
                   </a:solidFill>
@@ -4864,7 +5607,7 @@
             </a:ln>
             <a:extLst>
               <a:ext uri="{91240B29-F687-4f45-9708-019B960494DF}">
-                <a14:hiddenLine xmlns:a14="http://schemas.microsoft.com/office/drawing/2010/main" xmlns="" w="9525">
+                <a14:hiddenLine xmlns="" xmlns:a14="http://schemas.microsoft.com/office/drawing/2010/main" w="9525">
                   <a:solidFill>
                     <a:srgbClr val="000000"/>
                   </a:solidFill>
@@ -4926,7 +5669,7 @@
             </a:ln>
             <a:extLst>
               <a:ext uri="{91240B29-F687-4f45-9708-019B960494DF}">
-                <a14:hiddenLine xmlns:a14="http://schemas.microsoft.com/office/drawing/2010/main" xmlns="" w="9525">
+                <a14:hiddenLine xmlns="" xmlns:a14="http://schemas.microsoft.com/office/drawing/2010/main" w="9525">
                   <a:solidFill>
                     <a:srgbClr val="000000"/>
                   </a:solidFill>
@@ -5016,7 +5759,7 @@
             </a:ln>
             <a:extLst>
               <a:ext uri="{91240B29-F687-4f45-9708-019B960494DF}">
-                <a14:hiddenLine xmlns:a14="http://schemas.microsoft.com/office/drawing/2010/main" xmlns="" w="9525">
+                <a14:hiddenLine xmlns="" xmlns:a14="http://schemas.microsoft.com/office/drawing/2010/main" w="9525">
                   <a:solidFill>
                     <a:srgbClr val="000000"/>
                   </a:solidFill>
@@ -5078,7 +5821,7 @@
             </a:ln>
             <a:extLst>
               <a:ext uri="{91240B29-F687-4f45-9708-019B960494DF}">
-                <a14:hiddenLine xmlns:a14="http://schemas.microsoft.com/office/drawing/2010/main" xmlns="" w="9525">
+                <a14:hiddenLine xmlns="" xmlns:a14="http://schemas.microsoft.com/office/drawing/2010/main" w="9525">
                   <a:solidFill>
                     <a:srgbClr val="000000"/>
                   </a:solidFill>
@@ -5168,7 +5911,7 @@
             </a:ln>
             <a:extLst>
               <a:ext uri="{91240B29-F687-4f45-9708-019B960494DF}">
-                <a14:hiddenLine xmlns:a14="http://schemas.microsoft.com/office/drawing/2010/main" xmlns="" w="9525">
+                <a14:hiddenLine xmlns="" xmlns:a14="http://schemas.microsoft.com/office/drawing/2010/main" w="9525">
                   <a:solidFill>
                     <a:srgbClr val="000000"/>
                   </a:solidFill>
@@ -5202,7 +5945,7 @@
             </a:ln>
             <a:extLst>
               <a:ext uri="{91240B29-F687-4f45-9708-019B960494DF}">
-                <a14:hiddenLine xmlns:a14="http://schemas.microsoft.com/office/drawing/2010/main" xmlns="" w="9525">
+                <a14:hiddenLine xmlns="" xmlns:a14="http://schemas.microsoft.com/office/drawing/2010/main" w="9525">
                   <a:solidFill>
                     <a:srgbClr val="000000"/>
                   </a:solidFill>
@@ -5267,7 +6010,7 @@
             </a:ln>
             <a:extLst>
               <a:ext uri="{91240B29-F687-4f45-9708-019B960494DF}">
-                <a14:hiddenLine xmlns:a14="http://schemas.microsoft.com/office/drawing/2010/main" xmlns="" w="9525">
+                <a14:hiddenLine xmlns="" xmlns:a14="http://schemas.microsoft.com/office/drawing/2010/main" w="9525">
                   <a:solidFill>
                     <a:srgbClr val="000000"/>
                   </a:solidFill>
@@ -5357,7 +6100,7 @@
             </a:ln>
             <a:extLst>
               <a:ext uri="{91240B29-F687-4f45-9708-019B960494DF}">
-                <a14:hiddenLine xmlns:a14="http://schemas.microsoft.com/office/drawing/2010/main" xmlns="" w="9525">
+                <a14:hiddenLine xmlns="" xmlns:a14="http://schemas.microsoft.com/office/drawing/2010/main" w="9525">
                   <a:solidFill>
                     <a:srgbClr val="000000"/>
                   </a:solidFill>
@@ -5419,7 +6162,7 @@
             </a:ln>
             <a:extLst>
               <a:ext uri="{91240B29-F687-4f45-9708-019B960494DF}">
-                <a14:hiddenLine xmlns:a14="http://schemas.microsoft.com/office/drawing/2010/main" xmlns="" w="9525">
+                <a14:hiddenLine xmlns="" xmlns:a14="http://schemas.microsoft.com/office/drawing/2010/main" w="9525">
                   <a:solidFill>
                     <a:srgbClr val="000000"/>
                   </a:solidFill>
@@ -5509,7 +6252,7 @@
             </a:ln>
             <a:extLst>
               <a:ext uri="{91240B29-F687-4f45-9708-019B960494DF}">
-                <a14:hiddenLine xmlns:a14="http://schemas.microsoft.com/office/drawing/2010/main" xmlns="" w="9525">
+                <a14:hiddenLine xmlns="" xmlns:a14="http://schemas.microsoft.com/office/drawing/2010/main" w="9525">
                   <a:solidFill>
                     <a:srgbClr val="000000"/>
                   </a:solidFill>
@@ -5599,7 +6342,7 @@
             </a:ln>
             <a:extLst>
               <a:ext uri="{91240B29-F687-4f45-9708-019B960494DF}">
-                <a14:hiddenLine xmlns:a14="http://schemas.microsoft.com/office/drawing/2010/main" xmlns="" w="9525">
+                <a14:hiddenLine xmlns="" xmlns:a14="http://schemas.microsoft.com/office/drawing/2010/main" w="9525">
                   <a:solidFill>
                     <a:srgbClr val="000000"/>
                   </a:solidFill>
@@ -5664,7 +6407,7 @@
             </a:ln>
             <a:extLst>
               <a:ext uri="{91240B29-F687-4f45-9708-019B960494DF}">
-                <a14:hiddenLine xmlns:a14="http://schemas.microsoft.com/office/drawing/2010/main" xmlns="" w="9525">
+                <a14:hiddenLine xmlns="" xmlns:a14="http://schemas.microsoft.com/office/drawing/2010/main" w="9525">
                   <a:solidFill>
                     <a:srgbClr val="000000"/>
                   </a:solidFill>
@@ -5726,7 +6469,7 @@
             </a:ln>
             <a:extLst>
               <a:ext uri="{91240B29-F687-4f45-9708-019B960494DF}">
-                <a14:hiddenLine xmlns:a14="http://schemas.microsoft.com/office/drawing/2010/main" xmlns="" w="9525">
+                <a14:hiddenLine xmlns="" xmlns:a14="http://schemas.microsoft.com/office/drawing/2010/main" w="9525">
                   <a:solidFill>
                     <a:srgbClr val="000000"/>
                   </a:solidFill>
@@ -5816,7 +6559,7 @@
             </a:ln>
             <a:extLst>
               <a:ext uri="{91240B29-F687-4f45-9708-019B960494DF}">
-                <a14:hiddenLine xmlns:a14="http://schemas.microsoft.com/office/drawing/2010/main" xmlns="" w="9525">
+                <a14:hiddenLine xmlns="" xmlns:a14="http://schemas.microsoft.com/office/drawing/2010/main" w="9525">
                   <a:solidFill>
                     <a:srgbClr val="000000"/>
                   </a:solidFill>
@@ -5906,7 +6649,7 @@
             </a:ln>
             <a:extLst>
               <a:ext uri="{91240B29-F687-4f45-9708-019B960494DF}">
-                <a14:hiddenLine xmlns:a14="http://schemas.microsoft.com/office/drawing/2010/main" xmlns="" w="9525">
+                <a14:hiddenLine xmlns="" xmlns:a14="http://schemas.microsoft.com/office/drawing/2010/main" w="9525">
                   <a:solidFill>
                     <a:srgbClr val="000000"/>
                   </a:solidFill>
@@ -5968,7 +6711,7 @@
             </a:ln>
             <a:extLst>
               <a:ext uri="{91240B29-F687-4f45-9708-019B960494DF}">
-                <a14:hiddenLine xmlns:a14="http://schemas.microsoft.com/office/drawing/2010/main" xmlns="" w="9525">
+                <a14:hiddenLine xmlns="" xmlns:a14="http://schemas.microsoft.com/office/drawing/2010/main" w="9525">
                   <a:solidFill>
                     <a:srgbClr val="000000"/>
                   </a:solidFill>
@@ -6088,7 +6831,7 @@
             </a:ln>
             <a:extLst>
               <a:ext uri="{91240B29-F687-4f45-9708-019B960494DF}">
-                <a14:hiddenLine xmlns:a14="http://schemas.microsoft.com/office/drawing/2010/main" xmlns="" w="9525">
+                <a14:hiddenLine xmlns="" xmlns:a14="http://schemas.microsoft.com/office/drawing/2010/main" w="9525">
                   <a:solidFill>
                     <a:srgbClr val="000000"/>
                   </a:solidFill>
@@ -6156,7 +6899,7 @@
             </a:ln>
             <a:extLst>
               <a:ext uri="{91240B29-F687-4f45-9708-019B960494DF}">
-                <a14:hiddenLine xmlns:a14="http://schemas.microsoft.com/office/drawing/2010/main" xmlns="" w="9525">
+                <a14:hiddenLine xmlns="" xmlns:a14="http://schemas.microsoft.com/office/drawing/2010/main" w="9525">
                   <a:solidFill>
                     <a:srgbClr val="000000"/>
                   </a:solidFill>
@@ -6246,7 +6989,7 @@
             </a:ln>
             <a:extLst>
               <a:ext uri="{91240B29-F687-4f45-9708-019B960494DF}">
-                <a14:hiddenLine xmlns:a14="http://schemas.microsoft.com/office/drawing/2010/main" xmlns="" w="9525">
+                <a14:hiddenLine xmlns="" xmlns:a14="http://schemas.microsoft.com/office/drawing/2010/main" w="9525">
                   <a:solidFill>
                     <a:srgbClr val="000000"/>
                   </a:solidFill>
@@ -6386,7 +7129,7 @@
           <a:p>
             <a:fld id="{882D24FB-7729-40A5-988B-B7F786B2F842}" type="datetimeFigureOut">
               <a:rPr lang="en-US" smtClean="0"/>
-              <a:t>10/22/2018</a:t>
+              <a:t>11/27/2018</a:t>
             </a:fld>
             <a:endParaRPr lang="en-US"/>
           </a:p>
@@ -6653,7 +7396,7 @@
           <a:p>
             <a:fld id="{882D24FB-7729-40A5-988B-B7F786B2F842}" type="datetimeFigureOut">
               <a:rPr lang="en-US" smtClean="0"/>
-              <a:t>10/22/2018</a:t>
+              <a:t>11/27/2018</a:t>
             </a:fld>
             <a:endParaRPr lang="en-US"/>
           </a:p>
@@ -6849,7 +7592,7 @@
           <a:p>
             <a:fld id="{882D24FB-7729-40A5-988B-B7F786B2F842}" type="datetimeFigureOut">
               <a:rPr lang="en-US" smtClean="0"/>
-              <a:t>10/22/2018</a:t>
+              <a:t>11/27/2018</a:t>
             </a:fld>
             <a:endParaRPr lang="en-US"/>
           </a:p>
@@ -7112,7 +7855,7 @@
           <a:p>
             <a:fld id="{882D24FB-7729-40A5-988B-B7F786B2F842}" type="datetimeFigureOut">
               <a:rPr lang="en-US" smtClean="0"/>
-              <a:t>10/22/2018</a:t>
+              <a:t>11/27/2018</a:t>
             </a:fld>
             <a:endParaRPr lang="en-US"/>
           </a:p>
@@ -7546,7 +8289,7 @@
           <a:p>
             <a:fld id="{882D24FB-7729-40A5-988B-B7F786B2F842}" type="datetimeFigureOut">
               <a:rPr lang="en-US" smtClean="0"/>
-              <a:t>10/22/2018</a:t>
+              <a:t>11/27/2018</a:t>
             </a:fld>
             <a:endParaRPr lang="en-US"/>
           </a:p>
@@ -8092,7 +8835,7 @@
           <a:p>
             <a:fld id="{882D24FB-7729-40A5-988B-B7F786B2F842}" type="datetimeFigureOut">
               <a:rPr lang="en-US" smtClean="0"/>
-              <a:t>10/22/2018</a:t>
+              <a:t>11/27/2018</a:t>
             </a:fld>
             <a:endParaRPr lang="en-US"/>
           </a:p>
@@ -8812,7 +9555,7 @@
           <a:p>
             <a:fld id="{882D24FB-7729-40A5-988B-B7F786B2F842}" type="datetimeFigureOut">
               <a:rPr lang="en-US" smtClean="0"/>
-              <a:t>10/22/2018</a:t>
+              <a:t>11/27/2018</a:t>
             </a:fld>
             <a:endParaRPr lang="en-US"/>
           </a:p>
@@ -8982,7 +9725,7 @@
           <a:p>
             <a:fld id="{882D24FB-7729-40A5-988B-B7F786B2F842}" type="datetimeFigureOut">
               <a:rPr lang="en-US" smtClean="0"/>
-              <a:t>10/22/2018</a:t>
+              <a:t>11/27/2018</a:t>
             </a:fld>
             <a:endParaRPr lang="en-US"/>
           </a:p>
@@ -9162,7 +9905,7 @@
           <a:p>
             <a:fld id="{882D24FB-7729-40A5-988B-B7F786B2F842}" type="datetimeFigureOut">
               <a:rPr lang="en-US" smtClean="0"/>
-              <a:t>10/22/2018</a:t>
+              <a:t>11/27/2018</a:t>
             </a:fld>
             <a:endParaRPr lang="en-US"/>
           </a:p>
@@ -9332,7 +10075,7 @@
           <a:p>
             <a:fld id="{882D24FB-7729-40A5-988B-B7F786B2F842}" type="datetimeFigureOut">
               <a:rPr lang="en-US" smtClean="0"/>
-              <a:t>10/22/2018</a:t>
+              <a:t>11/27/2018</a:t>
             </a:fld>
             <a:endParaRPr lang="en-US"/>
           </a:p>
@@ -9582,7 +10325,7 @@
           <a:p>
             <a:fld id="{882D24FB-7729-40A5-988B-B7F786B2F842}" type="datetimeFigureOut">
               <a:rPr lang="en-US" smtClean="0"/>
-              <a:t>10/22/2018</a:t>
+              <a:t>11/27/2018</a:t>
             </a:fld>
             <a:endParaRPr lang="en-US"/>
           </a:p>
@@ -9814,7 +10557,7 @@
           <a:p>
             <a:fld id="{882D24FB-7729-40A5-988B-B7F786B2F842}" type="datetimeFigureOut">
               <a:rPr lang="en-US" smtClean="0"/>
-              <a:t>10/22/2018</a:t>
+              <a:t>11/27/2018</a:t>
             </a:fld>
             <a:endParaRPr lang="en-US"/>
           </a:p>
@@ -10195,7 +10938,7 @@
           <a:p>
             <a:fld id="{882D24FB-7729-40A5-988B-B7F786B2F842}" type="datetimeFigureOut">
               <a:rPr lang="en-US" smtClean="0"/>
-              <a:t>10/22/2018</a:t>
+              <a:t>11/27/2018</a:t>
             </a:fld>
             <a:endParaRPr lang="en-US"/>
           </a:p>
@@ -10313,7 +11056,7 @@
           <a:p>
             <a:fld id="{882D24FB-7729-40A5-988B-B7F786B2F842}" type="datetimeFigureOut">
               <a:rPr lang="en-US" smtClean="0"/>
-              <a:t>10/22/2018</a:t>
+              <a:t>11/27/2018</a:t>
             </a:fld>
             <a:endParaRPr lang="en-US"/>
           </a:p>
@@ -10408,7 +11151,7 @@
           <a:p>
             <a:fld id="{882D24FB-7729-40A5-988B-B7F786B2F842}" type="datetimeFigureOut">
               <a:rPr lang="en-US" smtClean="0"/>
-              <a:t>10/22/2018</a:t>
+              <a:t>11/27/2018</a:t>
             </a:fld>
             <a:endParaRPr lang="en-US"/>
           </a:p>
@@ -10657,7 +11400,7 @@
           <a:p>
             <a:fld id="{882D24FB-7729-40A5-988B-B7F786B2F842}" type="datetimeFigureOut">
               <a:rPr lang="en-US" smtClean="0"/>
-              <a:t>10/22/2018</a:t>
+              <a:t>11/27/2018</a:t>
             </a:fld>
             <a:endParaRPr lang="en-US"/>
           </a:p>
@@ -10937,7 +11680,7 @@
           <a:p>
             <a:fld id="{882D24FB-7729-40A5-988B-B7F786B2F842}" type="datetimeFigureOut">
               <a:rPr lang="en-US" smtClean="0"/>
-              <a:t>10/22/2018</a:t>
+              <a:t>11/27/2018</a:t>
             </a:fld>
             <a:endParaRPr lang="en-US"/>
           </a:p>
@@ -11060,7 +11803,7 @@
           <a:noFill/>
           <a:extLst>
             <a:ext uri="{909E8E84-426E-40dd-AFC4-6F175D3DCCD1}">
-              <a14:hiddenFill xmlns:a14="http://schemas.microsoft.com/office/drawing/2010/main" xmlns="">
+              <a14:hiddenFill xmlns="" xmlns:a14="http://schemas.microsoft.com/office/drawing/2010/main">
                 <a:solidFill>
                   <a:srgbClr val="FFFFFF"/>
                 </a:solidFill>
@@ -11134,7 +11877,7 @@
               </a:ln>
               <a:extLst>
                 <a:ext uri="{91240B29-F687-4f45-9708-019B960494DF}">
-                  <a14:hiddenLine xmlns:a14="http://schemas.microsoft.com/office/drawing/2010/main" xmlns="" w="9525">
+                  <a14:hiddenLine xmlns="" xmlns:a14="http://schemas.microsoft.com/office/drawing/2010/main" w="9525">
                     <a:solidFill>
                       <a:srgbClr val="000000"/>
                     </a:solidFill>
@@ -11224,7 +11967,7 @@
               </a:ln>
               <a:extLst>
                 <a:ext uri="{91240B29-F687-4f45-9708-019B960494DF}">
-                  <a14:hiddenLine xmlns:a14="http://schemas.microsoft.com/office/drawing/2010/main" xmlns="" w="9525">
+                  <a14:hiddenLine xmlns="" xmlns:a14="http://schemas.microsoft.com/office/drawing/2010/main" w="9525">
                     <a:solidFill>
                       <a:srgbClr val="000000"/>
                     </a:solidFill>
@@ -11314,7 +12057,7 @@
               </a:ln>
               <a:extLst>
                 <a:ext uri="{91240B29-F687-4f45-9708-019B960494DF}">
-                  <a14:hiddenLine xmlns:a14="http://schemas.microsoft.com/office/drawing/2010/main" xmlns="" w="9525">
+                  <a14:hiddenLine xmlns="" xmlns:a14="http://schemas.microsoft.com/office/drawing/2010/main" w="9525">
                     <a:solidFill>
                       <a:srgbClr val="000000"/>
                     </a:solidFill>
@@ -11376,7 +12119,7 @@
               </a:ln>
               <a:extLst>
                 <a:ext uri="{91240B29-F687-4f45-9708-019B960494DF}">
-                  <a14:hiddenLine xmlns:a14="http://schemas.microsoft.com/office/drawing/2010/main" xmlns="" w="9525">
+                  <a14:hiddenLine xmlns="" xmlns:a14="http://schemas.microsoft.com/office/drawing/2010/main" w="9525">
                     <a:solidFill>
                       <a:srgbClr val="000000"/>
                     </a:solidFill>
@@ -11466,7 +12209,7 @@
               </a:ln>
               <a:extLst>
                 <a:ext uri="{91240B29-F687-4f45-9708-019B960494DF}">
-                  <a14:hiddenLine xmlns:a14="http://schemas.microsoft.com/office/drawing/2010/main" xmlns="" w="9525">
+                  <a14:hiddenLine xmlns="" xmlns:a14="http://schemas.microsoft.com/office/drawing/2010/main" w="9525">
                     <a:solidFill>
                       <a:srgbClr val="000000"/>
                     </a:solidFill>
@@ -11528,7 +12271,7 @@
               </a:ln>
               <a:extLst>
                 <a:ext uri="{91240B29-F687-4f45-9708-019B960494DF}">
-                  <a14:hiddenLine xmlns:a14="http://schemas.microsoft.com/office/drawing/2010/main" xmlns="" w="9525">
+                  <a14:hiddenLine xmlns="" xmlns:a14="http://schemas.microsoft.com/office/drawing/2010/main" w="9525">
                     <a:solidFill>
                       <a:srgbClr val="000000"/>
                     </a:solidFill>
@@ -11590,7 +12333,7 @@
               </a:ln>
               <a:extLst>
                 <a:ext uri="{91240B29-F687-4f45-9708-019B960494DF}">
-                  <a14:hiddenLine xmlns:a14="http://schemas.microsoft.com/office/drawing/2010/main" xmlns="" w="9525">
+                  <a14:hiddenLine xmlns="" xmlns:a14="http://schemas.microsoft.com/office/drawing/2010/main" w="9525">
                     <a:solidFill>
                       <a:srgbClr val="000000"/>
                     </a:solidFill>
@@ -11680,7 +12423,7 @@
               </a:ln>
               <a:extLst>
                 <a:ext uri="{91240B29-F687-4f45-9708-019B960494DF}">
-                  <a14:hiddenLine xmlns:a14="http://schemas.microsoft.com/office/drawing/2010/main" xmlns="" w="9525">
+                  <a14:hiddenLine xmlns="" xmlns:a14="http://schemas.microsoft.com/office/drawing/2010/main" w="9525">
                     <a:solidFill>
                       <a:srgbClr val="000000"/>
                     </a:solidFill>
@@ -11770,7 +12513,7 @@
               </a:ln>
               <a:extLst>
                 <a:ext uri="{91240B29-F687-4f45-9708-019B960494DF}">
-                  <a14:hiddenLine xmlns:a14="http://schemas.microsoft.com/office/drawing/2010/main" xmlns="" w="9525">
+                  <a14:hiddenLine xmlns="" xmlns:a14="http://schemas.microsoft.com/office/drawing/2010/main" w="9525">
                     <a:solidFill>
                       <a:srgbClr val="000000"/>
                     </a:solidFill>
@@ -11832,7 +12575,7 @@
               </a:ln>
               <a:extLst>
                 <a:ext uri="{91240B29-F687-4f45-9708-019B960494DF}">
-                  <a14:hiddenLine xmlns:a14="http://schemas.microsoft.com/office/drawing/2010/main" xmlns="" w="9525">
+                  <a14:hiddenLine xmlns="" xmlns:a14="http://schemas.microsoft.com/office/drawing/2010/main" w="9525">
                     <a:solidFill>
                       <a:srgbClr val="000000"/>
                     </a:solidFill>
@@ -11942,7 +12685,7 @@
               </a:ln>
               <a:extLst>
                 <a:ext uri="{91240B29-F687-4f45-9708-019B960494DF}">
-                  <a14:hiddenLine xmlns:a14="http://schemas.microsoft.com/office/drawing/2010/main" xmlns="" w="9525">
+                  <a14:hiddenLine xmlns="" xmlns:a14="http://schemas.microsoft.com/office/drawing/2010/main" w="9525">
                     <a:solidFill>
                       <a:srgbClr val="000000"/>
                     </a:solidFill>
@@ -12026,7 +12769,7 @@
               </a:ln>
               <a:extLst>
                 <a:ext uri="{91240B29-F687-4f45-9708-019B960494DF}">
-                  <a14:hiddenLine xmlns:a14="http://schemas.microsoft.com/office/drawing/2010/main" xmlns="" w="9525">
+                  <a14:hiddenLine xmlns="" xmlns:a14="http://schemas.microsoft.com/office/drawing/2010/main" w="9525">
                     <a:solidFill>
                       <a:srgbClr val="000000"/>
                     </a:solidFill>
@@ -12088,7 +12831,7 @@
               </a:ln>
               <a:extLst>
                 <a:ext uri="{91240B29-F687-4f45-9708-019B960494DF}">
-                  <a14:hiddenLine xmlns:a14="http://schemas.microsoft.com/office/drawing/2010/main" xmlns="" w="9525">
+                  <a14:hiddenLine xmlns="" xmlns:a14="http://schemas.microsoft.com/office/drawing/2010/main" w="9525">
                     <a:solidFill>
                       <a:srgbClr val="000000"/>
                     </a:solidFill>
@@ -12150,7 +12893,7 @@
               </a:ln>
               <a:extLst>
                 <a:ext uri="{91240B29-F687-4f45-9708-019B960494DF}">
-                  <a14:hiddenLine xmlns:a14="http://schemas.microsoft.com/office/drawing/2010/main" xmlns="" w="9525">
+                  <a14:hiddenLine xmlns="" xmlns:a14="http://schemas.microsoft.com/office/drawing/2010/main" w="9525">
                     <a:solidFill>
                       <a:srgbClr val="000000"/>
                     </a:solidFill>
@@ -12240,7 +12983,7 @@
               </a:ln>
               <a:extLst>
                 <a:ext uri="{91240B29-F687-4f45-9708-019B960494DF}">
-                  <a14:hiddenLine xmlns:a14="http://schemas.microsoft.com/office/drawing/2010/main" xmlns="" w="9525">
+                  <a14:hiddenLine xmlns="" xmlns:a14="http://schemas.microsoft.com/office/drawing/2010/main" w="9525">
                     <a:solidFill>
                       <a:srgbClr val="000000"/>
                     </a:solidFill>
@@ -12274,7 +13017,7 @@
               </a:ln>
               <a:extLst>
                 <a:ext uri="{91240B29-F687-4f45-9708-019B960494DF}">
-                  <a14:hiddenLine xmlns:a14="http://schemas.microsoft.com/office/drawing/2010/main" xmlns="" w="9525">
+                  <a14:hiddenLine xmlns="" xmlns:a14="http://schemas.microsoft.com/office/drawing/2010/main" w="9525">
                     <a:solidFill>
                       <a:srgbClr val="000000"/>
                     </a:solidFill>
@@ -12339,7 +13082,7 @@
               </a:ln>
               <a:extLst>
                 <a:ext uri="{91240B29-F687-4f45-9708-019B960494DF}">
-                  <a14:hiddenLine xmlns:a14="http://schemas.microsoft.com/office/drawing/2010/main" xmlns="" w="9525">
+                  <a14:hiddenLine xmlns="" xmlns:a14="http://schemas.microsoft.com/office/drawing/2010/main" w="9525">
                     <a:solidFill>
                       <a:srgbClr val="000000"/>
                     </a:solidFill>
@@ -12429,7 +13172,7 @@
               </a:ln>
               <a:extLst>
                 <a:ext uri="{91240B29-F687-4f45-9708-019B960494DF}">
-                  <a14:hiddenLine xmlns:a14="http://schemas.microsoft.com/office/drawing/2010/main" xmlns="" w="9525">
+                  <a14:hiddenLine xmlns="" xmlns:a14="http://schemas.microsoft.com/office/drawing/2010/main" w="9525">
                     <a:solidFill>
                       <a:srgbClr val="000000"/>
                     </a:solidFill>
@@ -12491,7 +13234,7 @@
               </a:ln>
               <a:extLst>
                 <a:ext uri="{91240B29-F687-4f45-9708-019B960494DF}">
-                  <a14:hiddenLine xmlns:a14="http://schemas.microsoft.com/office/drawing/2010/main" xmlns="" w="9525">
+                  <a14:hiddenLine xmlns="" xmlns:a14="http://schemas.microsoft.com/office/drawing/2010/main" w="9525">
                     <a:solidFill>
                       <a:srgbClr val="000000"/>
                     </a:solidFill>
@@ -12581,7 +13324,7 @@
               </a:ln>
               <a:extLst>
                 <a:ext uri="{91240B29-F687-4f45-9708-019B960494DF}">
-                  <a14:hiddenLine xmlns:a14="http://schemas.microsoft.com/office/drawing/2010/main" xmlns="" w="9525">
+                  <a14:hiddenLine xmlns="" xmlns:a14="http://schemas.microsoft.com/office/drawing/2010/main" w="9525">
                     <a:solidFill>
                       <a:srgbClr val="000000"/>
                     </a:solidFill>
@@ -12646,7 +13389,7 @@
               </a:ln>
               <a:extLst>
                 <a:ext uri="{91240B29-F687-4f45-9708-019B960494DF}">
-                  <a14:hiddenLine xmlns:a14="http://schemas.microsoft.com/office/drawing/2010/main" xmlns="" w="9525">
+                  <a14:hiddenLine xmlns="" xmlns:a14="http://schemas.microsoft.com/office/drawing/2010/main" w="9525">
                     <a:solidFill>
                       <a:srgbClr val="000000"/>
                     </a:solidFill>
@@ -12708,7 +13451,7 @@
               </a:ln>
               <a:extLst>
                 <a:ext uri="{91240B29-F687-4f45-9708-019B960494DF}">
-                  <a14:hiddenLine xmlns:a14="http://schemas.microsoft.com/office/drawing/2010/main" xmlns="" w="9525">
+                  <a14:hiddenLine xmlns="" xmlns:a14="http://schemas.microsoft.com/office/drawing/2010/main" w="9525">
                     <a:solidFill>
                       <a:srgbClr val="000000"/>
                     </a:solidFill>
@@ -12798,7 +13541,7 @@
               </a:ln>
               <a:extLst>
                 <a:ext uri="{91240B29-F687-4f45-9708-019B960494DF}">
-                  <a14:hiddenLine xmlns:a14="http://schemas.microsoft.com/office/drawing/2010/main" xmlns="" w="9525">
+                  <a14:hiddenLine xmlns="" xmlns:a14="http://schemas.microsoft.com/office/drawing/2010/main" w="9525">
                     <a:solidFill>
                       <a:srgbClr val="000000"/>
                     </a:solidFill>
@@ -12888,7 +13631,7 @@
               </a:ln>
               <a:extLst>
                 <a:ext uri="{91240B29-F687-4f45-9708-019B960494DF}">
-                  <a14:hiddenLine xmlns:a14="http://schemas.microsoft.com/office/drawing/2010/main" xmlns="" w="9525">
+                  <a14:hiddenLine xmlns="" xmlns:a14="http://schemas.microsoft.com/office/drawing/2010/main" w="9525">
                     <a:solidFill>
                       <a:srgbClr val="000000"/>
                     </a:solidFill>
@@ -12953,7 +13696,7 @@
               </a:ln>
               <a:extLst>
                 <a:ext uri="{91240B29-F687-4f45-9708-019B960494DF}">
-                  <a14:hiddenLine xmlns:a14="http://schemas.microsoft.com/office/drawing/2010/main" xmlns="" w="9525">
+                  <a14:hiddenLine xmlns="" xmlns:a14="http://schemas.microsoft.com/office/drawing/2010/main" w="9525">
                     <a:solidFill>
                       <a:srgbClr val="000000"/>
                     </a:solidFill>
@@ -13073,7 +13816,7 @@
               </a:ln>
               <a:extLst>
                 <a:ext uri="{91240B29-F687-4f45-9708-019B960494DF}">
-                  <a14:hiddenLine xmlns:a14="http://schemas.microsoft.com/office/drawing/2010/main" xmlns="" w="9525">
+                  <a14:hiddenLine xmlns="" xmlns:a14="http://schemas.microsoft.com/office/drawing/2010/main" w="9525">
                     <a:solidFill>
                       <a:srgbClr val="000000"/>
                     </a:solidFill>
@@ -13154,7 +13897,7 @@
               </a:ln>
               <a:extLst>
                 <a:ext uri="{91240B29-F687-4f45-9708-019B960494DF}">
-                  <a14:hiddenLine xmlns:a14="http://schemas.microsoft.com/office/drawing/2010/main" xmlns="" w="9525">
+                  <a14:hiddenLine xmlns="" xmlns:a14="http://schemas.microsoft.com/office/drawing/2010/main" w="9525">
                     <a:solidFill>
                       <a:srgbClr val="000000"/>
                     </a:solidFill>
@@ -13269,7 +14012,7 @@
               </a:ln>
               <a:extLst>
                 <a:ext uri="{91240B29-F687-4f45-9708-019B960494DF}">
-                  <a14:hiddenLine xmlns:a14="http://schemas.microsoft.com/office/drawing/2010/main" xmlns="" w="9525">
+                  <a14:hiddenLine xmlns="" xmlns:a14="http://schemas.microsoft.com/office/drawing/2010/main" w="9525">
                     <a:solidFill>
                       <a:srgbClr val="000000"/>
                     </a:solidFill>
@@ -13359,7 +14102,7 @@
               </a:ln>
               <a:extLst>
                 <a:ext uri="{91240B29-F687-4f45-9708-019B960494DF}">
-                  <a14:hiddenLine xmlns:a14="http://schemas.microsoft.com/office/drawing/2010/main" xmlns="" w="9525">
+                  <a14:hiddenLine xmlns="" xmlns:a14="http://schemas.microsoft.com/office/drawing/2010/main" w="9525">
                     <a:solidFill>
                       <a:srgbClr val="000000"/>
                     </a:solidFill>
@@ -13424,7 +14167,7 @@
               </a:ln>
               <a:extLst>
                 <a:ext uri="{91240B29-F687-4f45-9708-019B960494DF}">
-                  <a14:hiddenLine xmlns:a14="http://schemas.microsoft.com/office/drawing/2010/main" xmlns="" w="9525">
+                  <a14:hiddenLine xmlns="" xmlns:a14="http://schemas.microsoft.com/office/drawing/2010/main" w="9525">
                     <a:solidFill>
                       <a:srgbClr val="000000"/>
                     </a:solidFill>
@@ -13514,7 +14257,7 @@
               </a:ln>
               <a:extLst>
                 <a:ext uri="{91240B29-F687-4f45-9708-019B960494DF}">
-                  <a14:hiddenLine xmlns:a14="http://schemas.microsoft.com/office/drawing/2010/main" xmlns="" w="9525">
+                  <a14:hiddenLine xmlns="" xmlns:a14="http://schemas.microsoft.com/office/drawing/2010/main" w="9525">
                     <a:solidFill>
                       <a:srgbClr val="000000"/>
                     </a:solidFill>
@@ -13582,7 +14325,7 @@
               </a:ln>
               <a:extLst>
                 <a:ext uri="{91240B29-F687-4f45-9708-019B960494DF}">
-                  <a14:hiddenLine xmlns:a14="http://schemas.microsoft.com/office/drawing/2010/main" xmlns="" w="9525">
+                  <a14:hiddenLine xmlns="" xmlns:a14="http://schemas.microsoft.com/office/drawing/2010/main" w="9525">
                     <a:solidFill>
                       <a:srgbClr val="000000"/>
                     </a:solidFill>
@@ -13672,7 +14415,7 @@
               </a:ln>
               <a:extLst>
                 <a:ext uri="{91240B29-F687-4f45-9708-019B960494DF}">
-                  <a14:hiddenLine xmlns:a14="http://schemas.microsoft.com/office/drawing/2010/main" xmlns="" w="9525">
+                  <a14:hiddenLine xmlns="" xmlns:a14="http://schemas.microsoft.com/office/drawing/2010/main" w="9525">
                     <a:solidFill>
                       <a:srgbClr val="000000"/>
                     </a:solidFill>
@@ -13740,7 +14483,7 @@
               </a:ln>
               <a:extLst>
                 <a:ext uri="{91240B29-F687-4f45-9708-019B960494DF}">
-                  <a14:hiddenLine xmlns:a14="http://schemas.microsoft.com/office/drawing/2010/main" xmlns="" w="9525">
+                  <a14:hiddenLine xmlns="" xmlns:a14="http://schemas.microsoft.com/office/drawing/2010/main" w="9525">
                     <a:solidFill>
                       <a:srgbClr val="000000"/>
                     </a:solidFill>
@@ -13830,7 +14573,7 @@
               </a:ln>
               <a:extLst>
                 <a:ext uri="{91240B29-F687-4f45-9708-019B960494DF}">
-                  <a14:hiddenLine xmlns:a14="http://schemas.microsoft.com/office/drawing/2010/main" xmlns="" w="9525">
+                  <a14:hiddenLine xmlns="" xmlns:a14="http://schemas.microsoft.com/office/drawing/2010/main" w="9525">
                     <a:solidFill>
                       <a:srgbClr val="000000"/>
                     </a:solidFill>
@@ -13864,7 +14607,7 @@
               </a:ln>
               <a:extLst>
                 <a:ext uri="{91240B29-F687-4f45-9708-019B960494DF}">
-                  <a14:hiddenLine xmlns:a14="http://schemas.microsoft.com/office/drawing/2010/main" xmlns="" w="9525">
+                  <a14:hiddenLine xmlns="" xmlns:a14="http://schemas.microsoft.com/office/drawing/2010/main" w="9525">
                     <a:solidFill>
                       <a:srgbClr val="000000"/>
                     </a:solidFill>
@@ -14004,7 +14747,7 @@
           <a:p>
             <a:fld id="{882D24FB-7729-40A5-988B-B7F786B2F842}" type="datetimeFigureOut">
               <a:rPr lang="en-US" smtClean="0"/>
-              <a:t>10/22/2018</a:t>
+              <a:t>11/27/2018</a:t>
             </a:fld>
             <a:endParaRPr lang="en-US"/>
           </a:p>
@@ -14410,6 +15153,14 @@
 <file path=ppt/slides/slide1.xml><?xml version="1.0" encoding="utf-8"?>
 <p:sld xmlns:a="http://schemas.openxmlformats.org/drawingml/2006/main" xmlns:r="http://schemas.openxmlformats.org/officeDocument/2006/relationships" xmlns:p="http://schemas.openxmlformats.org/presentationml/2006/main">
   <p:cSld>
+    <p:bg>
+      <p:bgPr>
+        <a:solidFill>
+          <a:schemeClr val="bg1"/>
+        </a:solidFill>
+        <a:effectLst/>
+      </p:bgPr>
+    </p:bg>
     <p:spTree>
       <p:nvGrpSpPr>
         <p:cNvPr id="1" name=""/>
@@ -14447,87 +15198,31 @@
           <a:lstStyle/>
           <a:p>
             <a:r>
-              <a:rPr lang="en-US" sz="2800" i="1" dirty="0" smtClean="0">
-                <a:solidFill>
-                  <a:schemeClr val="bg2">
-                    <a:lumMod val="40000"/>
-                    <a:lumOff val="60000"/>
-                  </a:schemeClr>
-                </a:solidFill>
-              </a:rPr>
+              <a:rPr lang="en-US" sz="2800" i="1" dirty="0" smtClean="0"/>
               <a:t>Simon Owens</a:t>
             </a:r>
             <a:br>
-              <a:rPr lang="en-US" sz="2800" i="1" dirty="0" smtClean="0">
-                <a:solidFill>
-                  <a:schemeClr val="bg2">
-                    <a:lumMod val="40000"/>
-                    <a:lumOff val="60000"/>
-                  </a:schemeClr>
-                </a:solidFill>
-              </a:rPr>
+              <a:rPr lang="en-US" sz="2800" i="1" dirty="0" smtClean="0"/>
             </a:br>
             <a:r>
-              <a:rPr lang="en-US" sz="2800" i="1" dirty="0" smtClean="0">
-                <a:solidFill>
-                  <a:schemeClr val="bg2">
-                    <a:lumMod val="40000"/>
-                    <a:lumOff val="60000"/>
-                  </a:schemeClr>
-                </a:solidFill>
-              </a:rPr>
+              <a:rPr lang="en-US" sz="2800" i="1" dirty="0" smtClean="0"/>
               <a:t>University of Evansville</a:t>
             </a:r>
             <a:br>
-              <a:rPr lang="en-US" sz="2800" i="1" dirty="0" smtClean="0">
-                <a:solidFill>
-                  <a:schemeClr val="bg2">
-                    <a:lumMod val="40000"/>
-                    <a:lumOff val="60000"/>
-                  </a:schemeClr>
-                </a:solidFill>
-              </a:rPr>
+              <a:rPr lang="en-US" sz="2800" i="1" dirty="0" smtClean="0"/>
             </a:br>
             <a:r>
-              <a:rPr lang="en-US" sz="2800" i="1" dirty="0" smtClean="0">
-                <a:solidFill>
-                  <a:schemeClr val="bg2">
-                    <a:lumMod val="40000"/>
-                    <a:lumOff val="60000"/>
-                  </a:schemeClr>
-                </a:solidFill>
-              </a:rPr>
+              <a:rPr lang="en-US" sz="2800" i="1" dirty="0" smtClean="0"/>
               <a:t>October 22, 2018</a:t>
             </a:r>
             <a:br>
-              <a:rPr lang="en-US" sz="2800" i="1" dirty="0" smtClean="0">
-                <a:solidFill>
-                  <a:schemeClr val="bg2">
-                    <a:lumMod val="40000"/>
-                    <a:lumOff val="60000"/>
-                  </a:schemeClr>
-                </a:solidFill>
-              </a:rPr>
+              <a:rPr lang="en-US" sz="2800" i="1" dirty="0" smtClean="0"/>
             </a:br>
             <a:r>
-              <a:rPr lang="en-US" sz="2800" i="1" dirty="0" smtClean="0">
-                <a:solidFill>
-                  <a:schemeClr val="bg2">
-                    <a:lumMod val="40000"/>
-                    <a:lumOff val="60000"/>
-                  </a:schemeClr>
-                </a:solidFill>
-              </a:rPr>
+              <a:rPr lang="en-US" sz="2800" i="1" dirty="0" smtClean="0"/>
               <a:t>Project sponsor/Advisor: Mark Randall</a:t>
             </a:r>
-            <a:endParaRPr lang="en-US" sz="2800" i="1" dirty="0">
-              <a:solidFill>
-                <a:schemeClr val="bg2">
-                  <a:lumMod val="40000"/>
-                  <a:lumOff val="60000"/>
-                </a:schemeClr>
-              </a:solidFill>
-            </a:endParaRPr>
+            <a:endParaRPr lang="en-US" sz="2800" i="1" dirty="0"/>
           </a:p>
         </p:txBody>
       </p:sp>
@@ -14629,14 +15324,14 @@
             <a:r>
               <a:rPr lang="en-US" sz="6600" b="1" i="1" dirty="0" smtClean="0">
                 <a:solidFill>
-                  <a:schemeClr val="bg1"/>
+                  <a:schemeClr val="tx1"/>
                 </a:solidFill>
               </a:rPr>
               <a:t>Security Lab Manager</a:t>
             </a:r>
             <a:endParaRPr lang="en-US" sz="6600" b="1" i="1" dirty="0">
               <a:solidFill>
-                <a:schemeClr val="bg1"/>
+                <a:schemeClr val="tx1"/>
               </a:solidFill>
             </a:endParaRPr>
           </a:p>
@@ -14665,6 +15360,14 @@
 <file path=ppt/slides/slide10.xml><?xml version="1.0" encoding="utf-8"?>
 <p:sld xmlns:a="http://schemas.openxmlformats.org/drawingml/2006/main" xmlns:r="http://schemas.openxmlformats.org/officeDocument/2006/relationships" xmlns:p="http://schemas.openxmlformats.org/presentationml/2006/main">
   <p:cSld>
+    <p:bg>
+      <p:bgPr>
+        <a:solidFill>
+          <a:schemeClr val="bg1"/>
+        </a:solidFill>
+        <a:effectLst/>
+      </p:bgPr>
+    </p:bg>
     <p:spTree>
       <p:nvGrpSpPr>
         <p:cNvPr id="1" name=""/>
@@ -14689,25 +15392,22 @@
             <p:ph type="title"/>
           </p:nvPr>
         </p:nvSpPr>
-        <p:spPr/>
+        <p:spPr>
+          <a:xfrm>
+            <a:off x="1141412" y="0"/>
+            <a:ext cx="9905998" cy="1478570"/>
+          </a:xfrm>
+        </p:spPr>
         <p:txBody>
           <a:bodyPr/>
           <a:lstStyle/>
           <a:p>
             <a:pPr algn="ctr"/>
             <a:r>
-              <a:rPr lang="en-US" dirty="0" smtClean="0">
-                <a:solidFill>
-                  <a:schemeClr val="bg1"/>
-                </a:solidFill>
-              </a:rPr>
+              <a:rPr lang="en-US" dirty="0" smtClean="0"/>
               <a:t>Instructor Interface</a:t>
             </a:r>
-            <a:endParaRPr lang="en-US" dirty="0">
-              <a:solidFill>
-                <a:schemeClr val="bg1"/>
-              </a:solidFill>
-            </a:endParaRPr>
+            <a:endParaRPr lang="en-US" dirty="0"/>
           </a:p>
         </p:txBody>
       </p:sp>
@@ -14758,6 +15458,14 @@
 <file path=ppt/slides/slide11.xml><?xml version="1.0" encoding="utf-8"?>
 <p:sld xmlns:a="http://schemas.openxmlformats.org/drawingml/2006/main" xmlns:r="http://schemas.openxmlformats.org/officeDocument/2006/relationships" xmlns:p="http://schemas.openxmlformats.org/presentationml/2006/main">
   <p:cSld>
+    <p:bg>
+      <p:bgPr>
+        <a:solidFill>
+          <a:schemeClr val="bg1"/>
+        </a:solidFill>
+        <a:effectLst/>
+      </p:bgPr>
+    </p:bg>
     <p:spTree>
       <p:nvGrpSpPr>
         <p:cNvPr id="1" name=""/>
@@ -14784,6 +15492,162 @@
         </p:nvSpPr>
         <p:spPr>
           <a:xfrm>
+            <a:off x="1141412" y="0"/>
+            <a:ext cx="9905998" cy="1478570"/>
+          </a:xfrm>
+        </p:spPr>
+        <p:txBody>
+          <a:bodyPr/>
+          <a:lstStyle/>
+          <a:p>
+            <a:pPr algn="ctr"/>
+            <a:r>
+              <a:rPr lang="en-US" dirty="0" smtClean="0"/>
+              <a:t>Architecture Overview</a:t>
+            </a:r>
+            <a:endParaRPr lang="en-US" dirty="0"/>
+          </a:p>
+        </p:txBody>
+      </p:sp>
+      <p:sp>
+        <p:nvSpPr>
+          <p:cNvPr id="5" name="Content Placeholder 2"/>
+          <p:cNvSpPr>
+            <a:spLocks noGrp="1"/>
+          </p:cNvSpPr>
+          <p:nvPr>
+            <p:ph idx="1"/>
+          </p:nvPr>
+        </p:nvSpPr>
+        <p:spPr>
+          <a:xfrm>
+            <a:off x="1141412" y="1710813"/>
+            <a:ext cx="4836601" cy="4080388"/>
+          </a:xfrm>
+        </p:spPr>
+        <p:txBody>
+          <a:bodyPr>
+            <a:normAutofit/>
+          </a:bodyPr>
+          <a:lstStyle/>
+          <a:p>
+            <a:r>
+              <a:rPr lang="en-US" sz="2800" dirty="0" smtClean="0"/>
+              <a:t>Client/Server</a:t>
+            </a:r>
+          </a:p>
+          <a:p>
+            <a:r>
+              <a:rPr lang="en-US" sz="2800" dirty="0" smtClean="0"/>
+              <a:t>Web Application</a:t>
+            </a:r>
+          </a:p>
+          <a:p>
+            <a:r>
+              <a:rPr lang="en-US" sz="2800" dirty="0" smtClean="0"/>
+              <a:t>Starts/Stops Docker containers</a:t>
+            </a:r>
+          </a:p>
+        </p:txBody>
+      </p:sp>
+      <p:pic>
+        <p:nvPicPr>
+          <p:cNvPr id="1026" name="Picture 2" descr="https://github.com/so87/Security-Lab-Manager/raw/dev/documentation/high-level-design.PNG"/>
+          <p:cNvPicPr>
+            <a:picLocks noChangeAspect="1" noChangeArrowheads="1"/>
+          </p:cNvPicPr>
+          <p:nvPr/>
+        </p:nvPicPr>
+        <p:blipFill>
+          <a:blip r:embed="rId3">
+            <a:extLst>
+              <a:ext uri="{28A0092B-C50C-407E-A947-70E740481C1C}">
+                <a14:useLocalDpi xmlns:a14="http://schemas.microsoft.com/office/drawing/2010/main" val="0"/>
+              </a:ext>
+            </a:extLst>
+          </a:blip>
+          <a:srcRect/>
+          <a:stretch>
+            <a:fillRect/>
+          </a:stretch>
+        </p:blipFill>
+        <p:spPr bwMode="auto">
+          <a:xfrm>
+            <a:off x="5378245" y="1710813"/>
+            <a:ext cx="6371303" cy="4827639"/>
+          </a:xfrm>
+          <a:prstGeom prst="rect">
+            <a:avLst/>
+          </a:prstGeom>
+          <a:noFill/>
+          <a:extLst>
+            <a:ext uri="{909E8E84-426E-40DD-AFC4-6F175D3DCCD1}">
+              <a14:hiddenFill xmlns:a14="http://schemas.microsoft.com/office/drawing/2010/main">
+                <a:solidFill>
+                  <a:srgbClr val="FFFFFF"/>
+                </a:solidFill>
+              </a14:hiddenFill>
+            </a:ext>
+          </a:extLst>
+        </p:spPr>
+      </p:pic>
+    </p:spTree>
+    <p:extLst>
+      <p:ext uri="{BB962C8B-B14F-4D97-AF65-F5344CB8AC3E}">
+        <p14:creationId xmlns:p14="http://schemas.microsoft.com/office/powerpoint/2010/main" val="4056442777"/>
+      </p:ext>
+    </p:extLst>
+  </p:cSld>
+  <p:clrMapOvr>
+    <a:masterClrMapping/>
+  </p:clrMapOvr>
+  <p:timing>
+    <p:tnLst>
+      <p:par>
+        <p:cTn id="1" dur="indefinite" restart="never" nodeType="tmRoot"/>
+      </p:par>
+    </p:tnLst>
+  </p:timing>
+</p:sld>
+</file>
+
+<file path=ppt/slides/slide12.xml><?xml version="1.0" encoding="utf-8"?>
+<p:sld xmlns:a="http://schemas.openxmlformats.org/drawingml/2006/main" xmlns:r="http://schemas.openxmlformats.org/officeDocument/2006/relationships" xmlns:p="http://schemas.openxmlformats.org/presentationml/2006/main">
+  <p:cSld>
+    <p:bg>
+      <p:bgPr>
+        <a:solidFill>
+          <a:schemeClr val="bg1"/>
+        </a:solidFill>
+        <a:effectLst/>
+      </p:bgPr>
+    </p:bg>
+    <p:spTree>
+      <p:nvGrpSpPr>
+        <p:cNvPr id="1" name=""/>
+        <p:cNvGrpSpPr/>
+        <p:nvPr/>
+      </p:nvGrpSpPr>
+      <p:grpSpPr>
+        <a:xfrm>
+          <a:off x="0" y="0"/>
+          <a:ext cx="0" cy="0"/>
+          <a:chOff x="0" y="0"/>
+          <a:chExt cx="0" cy="0"/>
+        </a:xfrm>
+      </p:grpSpPr>
+      <p:sp>
+        <p:nvSpPr>
+          <p:cNvPr id="2" name="Title 1"/>
+          <p:cNvSpPr>
+            <a:spLocks noGrp="1"/>
+          </p:cNvSpPr>
+          <p:nvPr>
+            <p:ph type="title"/>
+          </p:nvPr>
+        </p:nvSpPr>
+        <p:spPr>
+          <a:xfrm>
             <a:off x="1141413" y="-128733"/>
             <a:ext cx="9905998" cy="1478570"/>
           </a:xfrm>
@@ -14794,18 +15658,692 @@
           <a:p>
             <a:pPr algn="ctr"/>
             <a:r>
-              <a:rPr lang="en-US" dirty="0" smtClean="0">
+              <a:rPr lang="en-US" dirty="0" smtClean="0"/>
+              <a:t>Database design</a:t>
+            </a:r>
+            <a:endParaRPr lang="en-US" dirty="0"/>
+          </a:p>
+        </p:txBody>
+      </p:sp>
+      <p:sp>
+        <p:nvSpPr>
+          <p:cNvPr id="4" name="Content Placeholder 2"/>
+          <p:cNvSpPr>
+            <a:spLocks noGrp="1"/>
+          </p:cNvSpPr>
+          <p:nvPr>
+            <p:ph idx="1"/>
+          </p:nvPr>
+        </p:nvSpPr>
+        <p:spPr>
+          <a:xfrm>
+            <a:off x="1141412" y="1600558"/>
+            <a:ext cx="9905999" cy="3541714"/>
+          </a:xfrm>
+        </p:spPr>
+        <p:txBody>
+          <a:bodyPr>
+            <a:normAutofit/>
+          </a:bodyPr>
+          <a:lstStyle/>
+          <a:p>
+            <a:r>
+              <a:rPr lang="en-US" dirty="0" smtClean="0"/>
+              <a:t> PostgreSQL Docker Container</a:t>
+            </a:r>
+          </a:p>
+          <a:p>
+            <a:r>
+              <a:rPr lang="en-US" dirty="0" smtClean="0"/>
+              <a:t>Tables for</a:t>
+            </a:r>
+          </a:p>
+          <a:p>
+            <a:pPr lvl="1"/>
+            <a:r>
+              <a:rPr lang="en-US" dirty="0" smtClean="0"/>
+              <a:t>User</a:t>
+            </a:r>
+          </a:p>
+          <a:p>
+            <a:pPr lvl="1"/>
+            <a:r>
+              <a:rPr lang="en-US" dirty="0" smtClean="0"/>
+              <a:t>Administrator</a:t>
+            </a:r>
+          </a:p>
+          <a:p>
+            <a:pPr lvl="1"/>
+            <a:r>
+              <a:rPr lang="en-US" dirty="0" smtClean="0"/>
+              <a:t>Class</a:t>
+            </a:r>
+          </a:p>
+          <a:p>
+            <a:pPr lvl="1"/>
+            <a:r>
+              <a:rPr lang="en-US" dirty="0" smtClean="0"/>
+              <a:t>Exercise</a:t>
+            </a:r>
+          </a:p>
+          <a:p>
+            <a:r>
+              <a:rPr lang="en-US" dirty="0" smtClean="0"/>
+              <a:t>Accessing views </a:t>
+            </a:r>
+            <a:r>
+              <a:rPr lang="en-US" dirty="0" smtClean="0"/>
+              <a:t>in Django Framework</a:t>
+            </a:r>
+            <a:endParaRPr lang="en-US" dirty="0" smtClean="0"/>
+          </a:p>
+        </p:txBody>
+      </p:sp>
+    </p:spTree>
+    <p:extLst>
+      <p:ext uri="{BB962C8B-B14F-4D97-AF65-F5344CB8AC3E}">
+        <p14:creationId xmlns:p14="http://schemas.microsoft.com/office/powerpoint/2010/main" val="3027984131"/>
+      </p:ext>
+    </p:extLst>
+  </p:cSld>
+  <p:clrMapOvr>
+    <a:masterClrMapping/>
+  </p:clrMapOvr>
+  <p:timing>
+    <p:tnLst>
+      <p:par>
+        <p:cTn id="1" dur="indefinite" restart="never" nodeType="tmRoot"/>
+      </p:par>
+    </p:tnLst>
+  </p:timing>
+</p:sld>
+</file>
+
+<file path=ppt/slides/slide13.xml><?xml version="1.0" encoding="utf-8"?>
+<p:sld xmlns:a="http://schemas.openxmlformats.org/drawingml/2006/main" xmlns:r="http://schemas.openxmlformats.org/officeDocument/2006/relationships" xmlns:p="http://schemas.openxmlformats.org/presentationml/2006/main">
+  <p:cSld>
+    <p:bg>
+      <p:bgPr>
+        <a:solidFill>
+          <a:schemeClr val="bg1"/>
+        </a:solidFill>
+        <a:effectLst/>
+      </p:bgPr>
+    </p:bg>
+    <p:spTree>
+      <p:nvGrpSpPr>
+        <p:cNvPr id="1" name=""/>
+        <p:cNvGrpSpPr/>
+        <p:nvPr/>
+      </p:nvGrpSpPr>
+      <p:grpSpPr>
+        <a:xfrm>
+          <a:off x="0" y="0"/>
+          <a:ext cx="0" cy="0"/>
+          <a:chOff x="0" y="0"/>
+          <a:chExt cx="0" cy="0"/>
+        </a:xfrm>
+      </p:grpSpPr>
+      <p:sp>
+        <p:nvSpPr>
+          <p:cNvPr id="2" name="Title 1"/>
+          <p:cNvSpPr>
+            <a:spLocks noGrp="1"/>
+          </p:cNvSpPr>
+          <p:nvPr>
+            <p:ph type="title"/>
+          </p:nvPr>
+        </p:nvSpPr>
+        <p:spPr>
+          <a:xfrm>
+            <a:off x="1141413" y="-128733"/>
+            <a:ext cx="9905998" cy="1478570"/>
+          </a:xfrm>
+        </p:spPr>
+        <p:txBody>
+          <a:bodyPr/>
+          <a:lstStyle/>
+          <a:p>
+            <a:pPr algn="ctr"/>
+            <a:r>
+              <a:rPr lang="en-US" dirty="0" smtClean="0"/>
+              <a:t>Web exercise</a:t>
+            </a:r>
+            <a:endParaRPr lang="en-US" dirty="0"/>
+          </a:p>
+        </p:txBody>
+      </p:sp>
+      <p:pic>
+        <p:nvPicPr>
+          <p:cNvPr id="4" name="Picture 3"/>
+          <p:cNvPicPr>
+            <a:picLocks noChangeAspect="1"/>
+          </p:cNvPicPr>
+          <p:nvPr/>
+        </p:nvPicPr>
+        <p:blipFill>
+          <a:blip r:embed="rId3"/>
+          <a:stretch>
+            <a:fillRect/>
+          </a:stretch>
+        </p:blipFill>
+        <p:spPr>
+          <a:xfrm>
+            <a:off x="2913061" y="3817988"/>
+            <a:ext cx="6343650" cy="952500"/>
+          </a:xfrm>
+          <a:prstGeom prst="rect">
+            <a:avLst/>
+          </a:prstGeom>
+        </p:spPr>
+      </p:pic>
+      <p:pic>
+        <p:nvPicPr>
+          <p:cNvPr id="5" name="Picture 4"/>
+          <p:cNvPicPr>
+            <a:picLocks noChangeAspect="1"/>
+          </p:cNvPicPr>
+          <p:nvPr/>
+        </p:nvPicPr>
+        <p:blipFill>
+          <a:blip r:embed="rId4"/>
+          <a:stretch>
+            <a:fillRect/>
+          </a:stretch>
+        </p:blipFill>
+        <p:spPr>
+          <a:xfrm>
+            <a:off x="2922586" y="5747826"/>
+            <a:ext cx="6324600" cy="571500"/>
+          </a:xfrm>
+          <a:prstGeom prst="rect">
+            <a:avLst/>
+          </a:prstGeom>
+        </p:spPr>
+      </p:pic>
+      <p:sp>
+        <p:nvSpPr>
+          <p:cNvPr id="7" name="Content Placeholder 2"/>
+          <p:cNvSpPr>
+            <a:spLocks noGrp="1"/>
+          </p:cNvSpPr>
+          <p:nvPr>
+            <p:ph idx="1"/>
+          </p:nvPr>
+        </p:nvSpPr>
+        <p:spPr>
+          <a:xfrm>
+            <a:off x="1141412" y="1600558"/>
+            <a:ext cx="9905999" cy="3541714"/>
+          </a:xfrm>
+        </p:spPr>
+        <p:txBody>
+          <a:bodyPr>
+            <a:normAutofit/>
+          </a:bodyPr>
+          <a:lstStyle/>
+          <a:p>
+            <a:r>
+              <a:rPr lang="en-US" dirty="0" smtClean="0"/>
+              <a:t> Ubuntu Docker container hosting JavaScript code</a:t>
+            </a:r>
+          </a:p>
+          <a:p>
+            <a:r>
+              <a:rPr lang="en-US" dirty="0" smtClean="0"/>
+              <a:t>Cross Site Scripting</a:t>
+            </a:r>
+          </a:p>
+        </p:txBody>
+      </p:sp>
+      <p:sp>
+        <p:nvSpPr>
+          <p:cNvPr id="6" name="TextBox 5"/>
+          <p:cNvSpPr txBox="1"/>
+          <p:nvPr/>
+        </p:nvSpPr>
+        <p:spPr>
+          <a:xfrm>
+            <a:off x="4540914" y="3302891"/>
+            <a:ext cx="3106994" cy="369332"/>
+          </a:xfrm>
+          <a:prstGeom prst="rect">
+            <a:avLst/>
+          </a:prstGeom>
+          <a:noFill/>
+        </p:spPr>
+        <p:txBody>
+          <a:bodyPr wrap="square" rtlCol="0">
+            <a:spAutoFit/>
+          </a:bodyPr>
+          <a:lstStyle/>
+          <a:p>
+            <a:pPr algn="ctr"/>
+            <a:r>
+              <a:rPr lang="en-US" dirty="0" smtClean="0"/>
+              <a:t>Vulnerable JavaScript</a:t>
+            </a:r>
+            <a:endParaRPr lang="en-US" dirty="0"/>
+          </a:p>
+        </p:txBody>
+      </p:sp>
+      <p:sp>
+        <p:nvSpPr>
+          <p:cNvPr id="9" name="TextBox 8"/>
+          <p:cNvSpPr txBox="1"/>
+          <p:nvPr/>
+        </p:nvSpPr>
+        <p:spPr>
+          <a:xfrm>
+            <a:off x="4531389" y="5288037"/>
+            <a:ext cx="3106994" cy="369332"/>
+          </a:xfrm>
+          <a:prstGeom prst="rect">
+            <a:avLst/>
+          </a:prstGeom>
+          <a:noFill/>
+        </p:spPr>
+        <p:txBody>
+          <a:bodyPr wrap="square" rtlCol="0">
+            <a:spAutoFit/>
+          </a:bodyPr>
+          <a:lstStyle/>
+          <a:p>
+            <a:pPr algn="ctr"/>
+            <a:r>
+              <a:rPr lang="en-US" dirty="0" smtClean="0"/>
+              <a:t>XSS code</a:t>
+            </a:r>
+            <a:endParaRPr lang="en-US" dirty="0"/>
+          </a:p>
+        </p:txBody>
+      </p:sp>
+    </p:spTree>
+    <p:extLst>
+      <p:ext uri="{BB962C8B-B14F-4D97-AF65-F5344CB8AC3E}">
+        <p14:creationId xmlns:p14="http://schemas.microsoft.com/office/powerpoint/2010/main" val="910269529"/>
+      </p:ext>
+    </p:extLst>
+  </p:cSld>
+  <p:clrMapOvr>
+    <a:masterClrMapping/>
+  </p:clrMapOvr>
+  <p:timing>
+    <p:tnLst>
+      <p:par>
+        <p:cTn id="1" dur="indefinite" restart="never" nodeType="tmRoot"/>
+      </p:par>
+    </p:tnLst>
+  </p:timing>
+</p:sld>
+</file>
+
+<file path=ppt/slides/slide14.xml><?xml version="1.0" encoding="utf-8"?>
+<p:sld xmlns:a="http://schemas.openxmlformats.org/drawingml/2006/main" xmlns:r="http://schemas.openxmlformats.org/officeDocument/2006/relationships" xmlns:p="http://schemas.openxmlformats.org/presentationml/2006/main">
+  <p:cSld>
+    <p:bg>
+      <p:bgPr>
+        <a:solidFill>
+          <a:schemeClr val="bg1"/>
+        </a:solidFill>
+        <a:effectLst/>
+      </p:bgPr>
+    </p:bg>
+    <p:spTree>
+      <p:nvGrpSpPr>
+        <p:cNvPr id="1" name=""/>
+        <p:cNvGrpSpPr/>
+        <p:nvPr/>
+      </p:nvGrpSpPr>
+      <p:grpSpPr>
+        <a:xfrm>
+          <a:off x="0" y="0"/>
+          <a:ext cx="0" cy="0"/>
+          <a:chOff x="0" y="0"/>
+          <a:chExt cx="0" cy="0"/>
+        </a:xfrm>
+      </p:grpSpPr>
+      <p:sp>
+        <p:nvSpPr>
+          <p:cNvPr id="2" name="Title 1"/>
+          <p:cNvSpPr>
+            <a:spLocks noGrp="1"/>
+          </p:cNvSpPr>
+          <p:nvPr>
+            <p:ph type="title"/>
+          </p:nvPr>
+        </p:nvSpPr>
+        <p:spPr>
+          <a:xfrm>
+            <a:off x="1141413" y="-128733"/>
+            <a:ext cx="9905998" cy="1478570"/>
+          </a:xfrm>
+        </p:spPr>
+        <p:txBody>
+          <a:bodyPr/>
+          <a:lstStyle/>
+          <a:p>
+            <a:pPr algn="ctr"/>
+            <a:r>
+              <a:rPr lang="en-US" dirty="0" smtClean="0"/>
+              <a:t>Desktop exercise</a:t>
+            </a:r>
+            <a:endParaRPr lang="en-US" dirty="0"/>
+          </a:p>
+        </p:txBody>
+      </p:sp>
+      <p:sp>
+        <p:nvSpPr>
+          <p:cNvPr id="4" name="Content Placeholder 2"/>
+          <p:cNvSpPr>
+            <a:spLocks noGrp="1"/>
+          </p:cNvSpPr>
+          <p:nvPr>
+            <p:ph idx="1"/>
+          </p:nvPr>
+        </p:nvSpPr>
+        <p:spPr>
+          <a:xfrm>
+            <a:off x="1141412" y="1600558"/>
+            <a:ext cx="9905999" cy="3541714"/>
+          </a:xfrm>
+        </p:spPr>
+        <p:txBody>
+          <a:bodyPr>
+            <a:normAutofit/>
+          </a:bodyPr>
+          <a:lstStyle/>
+          <a:p>
+            <a:r>
+              <a:rPr lang="en-US" dirty="0" smtClean="0"/>
+              <a:t> Ubuntu Docker container hosting C++ Code</a:t>
+            </a:r>
+          </a:p>
+          <a:p>
+            <a:r>
+              <a:rPr lang="en-US" dirty="0" smtClean="0"/>
+              <a:t>Format String Vulnerability</a:t>
+            </a:r>
+            <a:endParaRPr lang="en-US" dirty="0" smtClean="0"/>
+          </a:p>
+        </p:txBody>
+      </p:sp>
+      <p:pic>
+        <p:nvPicPr>
+          <p:cNvPr id="2050" name="Picture 2" descr="Image result for format string vulnerability"/>
+          <p:cNvPicPr>
+            <a:picLocks noChangeAspect="1" noChangeArrowheads="1"/>
+          </p:cNvPicPr>
+          <p:nvPr/>
+        </p:nvPicPr>
+        <p:blipFill>
+          <a:blip r:embed="rId3">
+            <a:extLst>
+              <a:ext uri="{28A0092B-C50C-407E-A947-70E740481C1C}">
+                <a14:useLocalDpi xmlns:a14="http://schemas.microsoft.com/office/drawing/2010/main" val="0"/>
+              </a:ext>
+            </a:extLst>
+          </a:blip>
+          <a:srcRect/>
+          <a:stretch>
+            <a:fillRect/>
+          </a:stretch>
+        </p:blipFill>
+        <p:spPr bwMode="auto">
+          <a:xfrm>
+            <a:off x="3124917" y="3004369"/>
+            <a:ext cx="6087909" cy="3649516"/>
+          </a:xfrm>
+          <a:prstGeom prst="rect">
+            <a:avLst/>
+          </a:prstGeom>
+          <a:noFill/>
+          <a:extLst>
+            <a:ext uri="{909E8E84-426E-40DD-AFC4-6F175D3DCCD1}">
+              <a14:hiddenFill xmlns:a14="http://schemas.microsoft.com/office/drawing/2010/main">
                 <a:solidFill>
-                  <a:schemeClr val="bg1"/>
+                  <a:srgbClr val="FFFFFF"/>
                 </a:solidFill>
-              </a:rPr>
+              </a14:hiddenFill>
+            </a:ext>
+          </a:extLst>
+        </p:spPr>
+      </p:pic>
+    </p:spTree>
+    <p:extLst>
+      <p:ext uri="{BB962C8B-B14F-4D97-AF65-F5344CB8AC3E}">
+        <p14:creationId xmlns:p14="http://schemas.microsoft.com/office/powerpoint/2010/main" val="3175967577"/>
+      </p:ext>
+    </p:extLst>
+  </p:cSld>
+  <p:clrMapOvr>
+    <a:masterClrMapping/>
+  </p:clrMapOvr>
+  <p:timing>
+    <p:tnLst>
+      <p:par>
+        <p:cTn id="1" dur="indefinite" restart="never" nodeType="tmRoot"/>
+      </p:par>
+    </p:tnLst>
+  </p:timing>
+</p:sld>
+</file>
+
+<file path=ppt/slides/slide15.xml><?xml version="1.0" encoding="utf-8"?>
+<p:sld xmlns:a="http://schemas.openxmlformats.org/drawingml/2006/main" xmlns:r="http://schemas.openxmlformats.org/officeDocument/2006/relationships" xmlns:p="http://schemas.openxmlformats.org/presentationml/2006/main">
+  <p:cSld>
+    <p:bg>
+      <p:bgPr>
+        <a:solidFill>
+          <a:schemeClr val="bg1"/>
+        </a:solidFill>
+        <a:effectLst/>
+      </p:bgPr>
+    </p:bg>
+    <p:spTree>
+      <p:nvGrpSpPr>
+        <p:cNvPr id="1" name=""/>
+        <p:cNvGrpSpPr/>
+        <p:nvPr/>
+      </p:nvGrpSpPr>
+      <p:grpSpPr>
+        <a:xfrm>
+          <a:off x="0" y="0"/>
+          <a:ext cx="0" cy="0"/>
+          <a:chOff x="0" y="0"/>
+          <a:chExt cx="0" cy="0"/>
+        </a:xfrm>
+      </p:grpSpPr>
+      <p:sp>
+        <p:nvSpPr>
+          <p:cNvPr id="2" name="Title 1"/>
+          <p:cNvSpPr>
+            <a:spLocks noGrp="1"/>
+          </p:cNvSpPr>
+          <p:nvPr>
+            <p:ph type="title"/>
+          </p:nvPr>
+        </p:nvSpPr>
+        <p:spPr>
+          <a:xfrm>
+            <a:off x="1141413" y="-58994"/>
+            <a:ext cx="9905998" cy="1478570"/>
+          </a:xfrm>
+        </p:spPr>
+        <p:txBody>
+          <a:bodyPr/>
+          <a:lstStyle/>
+          <a:p>
+            <a:pPr algn="ctr"/>
+            <a:r>
+              <a:rPr lang="en-US" dirty="0" smtClean="0"/>
+              <a:t>Developing Securely</a:t>
+            </a:r>
+            <a:endParaRPr lang="en-US" dirty="0"/>
+          </a:p>
+        </p:txBody>
+      </p:sp>
+      <p:sp>
+        <p:nvSpPr>
+          <p:cNvPr id="3" name="Content Placeholder 2"/>
+          <p:cNvSpPr>
+            <a:spLocks noGrp="1"/>
+          </p:cNvSpPr>
+          <p:nvPr>
+            <p:ph idx="1"/>
+          </p:nvPr>
+        </p:nvSpPr>
+        <p:spPr>
+          <a:xfrm>
+            <a:off x="1141412" y="1600558"/>
+            <a:ext cx="9905999" cy="3541714"/>
+          </a:xfrm>
+        </p:spPr>
+        <p:txBody>
+          <a:bodyPr>
+            <a:normAutofit/>
+          </a:bodyPr>
+          <a:lstStyle/>
+          <a:p>
+            <a:r>
+              <a:rPr lang="en-US" dirty="0" err="1" smtClean="0"/>
+              <a:t>Synk</a:t>
+            </a:r>
+            <a:r>
+              <a:rPr lang="en-US" dirty="0" smtClean="0"/>
+              <a:t> for dependency vulnerabilities</a:t>
+            </a:r>
+          </a:p>
+          <a:p>
+            <a:r>
+              <a:rPr lang="en-US" dirty="0" err="1" smtClean="0"/>
+              <a:t>Sonarqube</a:t>
+            </a:r>
+            <a:r>
+              <a:rPr lang="en-US" dirty="0" smtClean="0"/>
+              <a:t> for software vulnerabilities</a:t>
+            </a:r>
+          </a:p>
+          <a:p>
+            <a:r>
+              <a:rPr lang="en-US" dirty="0" smtClean="0"/>
+              <a:t>OWASP ZAP for continuous vulnerability scanning </a:t>
+            </a:r>
+          </a:p>
+          <a:p>
+            <a:r>
+              <a:rPr lang="en-US" dirty="0" smtClean="0"/>
+              <a:t>Security assessment for OWASP Top 10</a:t>
+            </a:r>
+          </a:p>
+          <a:p>
+            <a:r>
+              <a:rPr lang="en-US" dirty="0" smtClean="0"/>
+              <a:t>Reporting on </a:t>
+            </a:r>
+            <a:r>
+              <a:rPr lang="en-US" dirty="0" err="1" smtClean="0"/>
+              <a:t>Github</a:t>
+            </a:r>
+            <a:endParaRPr lang="en-US" dirty="0"/>
+          </a:p>
+        </p:txBody>
+      </p:sp>
+      <p:pic>
+        <p:nvPicPr>
+          <p:cNvPr id="4" name="Picture 3"/>
+          <p:cNvPicPr>
+            <a:picLocks noChangeAspect="1"/>
+          </p:cNvPicPr>
+          <p:nvPr/>
+        </p:nvPicPr>
+        <p:blipFill>
+          <a:blip r:embed="rId3"/>
+          <a:stretch>
+            <a:fillRect/>
+          </a:stretch>
+        </p:blipFill>
+        <p:spPr>
+          <a:xfrm>
+            <a:off x="1457325" y="4384881"/>
+            <a:ext cx="8058150" cy="1200150"/>
+          </a:xfrm>
+          <a:prstGeom prst="rect">
+            <a:avLst/>
+          </a:prstGeom>
+        </p:spPr>
+      </p:pic>
+    </p:spTree>
+    <p:extLst>
+      <p:ext uri="{BB962C8B-B14F-4D97-AF65-F5344CB8AC3E}">
+        <p14:creationId xmlns:p14="http://schemas.microsoft.com/office/powerpoint/2010/main" val="2687863557"/>
+      </p:ext>
+    </p:extLst>
+  </p:cSld>
+  <p:clrMapOvr>
+    <a:masterClrMapping/>
+  </p:clrMapOvr>
+  <p:timing>
+    <p:tnLst>
+      <p:par>
+        <p:cTn id="1" dur="indefinite" restart="never" nodeType="tmRoot"/>
+      </p:par>
+    </p:tnLst>
+  </p:timing>
+</p:sld>
+</file>
+
+<file path=ppt/slides/slide16.xml><?xml version="1.0" encoding="utf-8"?>
+<p:sld xmlns:a="http://schemas.openxmlformats.org/drawingml/2006/main" xmlns:r="http://schemas.openxmlformats.org/officeDocument/2006/relationships" xmlns:p="http://schemas.openxmlformats.org/presentationml/2006/main">
+  <p:cSld>
+    <p:bg>
+      <p:bgPr>
+        <a:solidFill>
+          <a:schemeClr val="bg1"/>
+        </a:solidFill>
+        <a:effectLst/>
+      </p:bgPr>
+    </p:bg>
+    <p:spTree>
+      <p:nvGrpSpPr>
+        <p:cNvPr id="1" name=""/>
+        <p:cNvGrpSpPr/>
+        <p:nvPr/>
+      </p:nvGrpSpPr>
+      <p:grpSpPr>
+        <a:xfrm>
+          <a:off x="0" y="0"/>
+          <a:ext cx="0" cy="0"/>
+          <a:chOff x="0" y="0"/>
+          <a:chExt cx="0" cy="0"/>
+        </a:xfrm>
+      </p:grpSpPr>
+      <p:sp>
+        <p:nvSpPr>
+          <p:cNvPr id="2" name="Title 1"/>
+          <p:cNvSpPr>
+            <a:spLocks noGrp="1"/>
+          </p:cNvSpPr>
+          <p:nvPr>
+            <p:ph type="title"/>
+          </p:nvPr>
+        </p:nvSpPr>
+        <p:spPr>
+          <a:xfrm>
+            <a:off x="1141413" y="-128733"/>
+            <a:ext cx="9905998" cy="1478570"/>
+          </a:xfrm>
+        </p:spPr>
+        <p:txBody>
+          <a:bodyPr/>
+          <a:lstStyle/>
+          <a:p>
+            <a:pPr algn="ctr"/>
+            <a:r>
+              <a:rPr lang="en-US" dirty="0" smtClean="0"/>
               <a:t>Continuous integration</a:t>
             </a:r>
-            <a:endParaRPr lang="en-US" dirty="0">
-              <a:solidFill>
-                <a:schemeClr val="bg1"/>
-              </a:solidFill>
-            </a:endParaRPr>
+            <a:endParaRPr lang="en-US" dirty="0"/>
           </a:p>
         </p:txBody>
       </p:sp>
@@ -14870,9 +16408,17 @@
 </p:sld>
 </file>
 
-<file path=ppt/slides/slide12.xml><?xml version="1.0" encoding="utf-8"?>
+<file path=ppt/slides/slide17.xml><?xml version="1.0" encoding="utf-8"?>
 <p:sld xmlns:a="http://schemas.openxmlformats.org/drawingml/2006/main" xmlns:r="http://schemas.openxmlformats.org/officeDocument/2006/relationships" xmlns:p="http://schemas.openxmlformats.org/presentationml/2006/main">
   <p:cSld>
+    <p:bg>
+      <p:bgPr>
+        <a:solidFill>
+          <a:schemeClr val="bg1"/>
+        </a:solidFill>
+        <a:effectLst/>
+      </p:bgPr>
+    </p:bg>
     <p:spTree>
       <p:nvGrpSpPr>
         <p:cNvPr id="1" name=""/>
@@ -14897,31 +16443,28 @@
             <p:ph type="title"/>
           </p:nvPr>
         </p:nvSpPr>
-        <p:spPr/>
+        <p:spPr>
+          <a:xfrm>
+            <a:off x="1141413" y="-128733"/>
+            <a:ext cx="9905998" cy="1478570"/>
+          </a:xfrm>
+        </p:spPr>
         <p:txBody>
           <a:bodyPr/>
           <a:lstStyle/>
           <a:p>
             <a:pPr algn="ctr"/>
             <a:r>
-              <a:rPr lang="en-US" dirty="0" smtClean="0">
-                <a:solidFill>
-                  <a:schemeClr val="bg1"/>
-                </a:solidFill>
-              </a:rPr>
-              <a:t>Developing Securely</a:t>
+              <a:rPr lang="en-US" dirty="0" smtClean="0"/>
+              <a:t>Design considerations</a:t>
             </a:r>
-            <a:endParaRPr lang="en-US" dirty="0">
-              <a:solidFill>
-                <a:schemeClr val="bg1"/>
-              </a:solidFill>
-            </a:endParaRPr>
-          </a:p>
-        </p:txBody>
-      </p:sp>
-      <p:sp>
-        <p:nvSpPr>
-          <p:cNvPr id="3" name="Content Placeholder 2"/>
+            <a:endParaRPr lang="en-US" dirty="0"/>
+          </a:p>
+        </p:txBody>
+      </p:sp>
+      <p:sp>
+        <p:nvSpPr>
+          <p:cNvPr id="7" name="Content Placeholder 2"/>
           <p:cNvSpPr>
             <a:spLocks noGrp="1"/>
           </p:cNvSpPr>
@@ -14937,118 +16480,169 @@
         </p:spPr>
         <p:txBody>
           <a:bodyPr>
-            <a:normAutofit/>
+            <a:normAutofit lnSpcReduction="10000"/>
           </a:bodyPr>
           <a:lstStyle/>
           <a:p>
             <a:r>
-              <a:rPr lang="en-US" dirty="0" err="1" smtClean="0">
-                <a:solidFill>
-                  <a:schemeClr val="tx2"/>
-                </a:solidFill>
-              </a:rPr>
-              <a:t>Synk</a:t>
+              <a:rPr lang="en-US" dirty="0" smtClean="0"/>
+              <a:t>Docker Containers – Scalability and Efficiency</a:t>
             </a:r>
+          </a:p>
+          <a:p>
             <a:r>
-              <a:rPr lang="en-US" dirty="0" smtClean="0">
-                <a:solidFill>
-                  <a:schemeClr val="tx2"/>
-                </a:solidFill>
-              </a:rPr>
-              <a:t> for dependency vulnerabilities</a:t>
+              <a:rPr lang="en-US" dirty="0" smtClean="0"/>
+              <a:t>Nginx – Load balancing and static file delivery</a:t>
             </a:r>
           </a:p>
           <a:p>
             <a:r>
-              <a:rPr lang="en-US" dirty="0" err="1" smtClean="0">
-                <a:solidFill>
-                  <a:schemeClr val="tx2"/>
-                </a:solidFill>
-              </a:rPr>
-              <a:t>Sonarqube</a:t>
+              <a:rPr lang="en-US" dirty="0" smtClean="0"/>
+              <a:t>Django – Structured web framework because of python familiarity</a:t>
             </a:r>
+          </a:p>
+          <a:p>
             <a:r>
-              <a:rPr lang="en-US" dirty="0" smtClean="0">
-                <a:solidFill>
-                  <a:schemeClr val="tx2"/>
-                </a:solidFill>
-              </a:rPr>
-              <a:t> for software vulnerabilities</a:t>
+              <a:rPr lang="en-US" dirty="0" smtClean="0"/>
+              <a:t>Sonarqube &amp; OWASP ZAP – secure development </a:t>
             </a:r>
           </a:p>
           <a:p>
             <a:r>
-              <a:rPr lang="en-US" dirty="0" smtClean="0">
-                <a:solidFill>
-                  <a:schemeClr val="tx2"/>
-                </a:solidFill>
-              </a:rPr>
-              <a:t>OWASP ZAP for continuous vulnerability scanning </a:t>
+              <a:rPr lang="en-US" dirty="0" smtClean="0"/>
+              <a:t>Selenium and Mocha – simple unit and functional testing frameworks</a:t>
             </a:r>
           </a:p>
           <a:p>
-            <a:r>
-              <a:rPr lang="en-US" dirty="0" smtClean="0">
-                <a:solidFill>
-                  <a:schemeClr val="tx2"/>
-                </a:solidFill>
-              </a:rPr>
-              <a:t>Security assessment for OWASP Top 10</a:t>
-            </a:r>
-          </a:p>
-          <a:p>
-            <a:r>
-              <a:rPr lang="en-US" dirty="0" smtClean="0">
-                <a:solidFill>
-                  <a:schemeClr val="tx2"/>
-                </a:solidFill>
-              </a:rPr>
-              <a:t>Reporting on </a:t>
-            </a:r>
-            <a:r>
-              <a:rPr lang="en-US" dirty="0" err="1" smtClean="0">
-                <a:solidFill>
-                  <a:schemeClr val="tx2"/>
-                </a:solidFill>
-              </a:rPr>
-              <a:t>Github</a:t>
-            </a:r>
-            <a:endParaRPr lang="en-US" dirty="0">
-              <a:solidFill>
-                <a:schemeClr val="tx2"/>
-              </a:solidFill>
-            </a:endParaRPr>
-          </a:p>
-        </p:txBody>
-      </p:sp>
-      <p:pic>
-        <p:nvPicPr>
-          <p:cNvPr id="4" name="Picture 3"/>
-          <p:cNvPicPr>
-            <a:picLocks noChangeAspect="1"/>
-          </p:cNvPicPr>
-          <p:nvPr/>
-        </p:nvPicPr>
-        <p:blipFill>
-          <a:blip r:embed="rId3"/>
-          <a:stretch>
-            <a:fillRect/>
-          </a:stretch>
-        </p:blipFill>
+            <a:endParaRPr lang="en-US" dirty="0" smtClean="0"/>
+          </a:p>
+          <a:p>
+            <a:endParaRPr lang="en-US" dirty="0"/>
+          </a:p>
+        </p:txBody>
+      </p:sp>
+    </p:spTree>
+    <p:extLst>
+      <p:ext uri="{BB962C8B-B14F-4D97-AF65-F5344CB8AC3E}">
+        <p14:creationId xmlns:p14="http://schemas.microsoft.com/office/powerpoint/2010/main" val="35810874"/>
+      </p:ext>
+    </p:extLst>
+  </p:cSld>
+  <p:clrMapOvr>
+    <a:masterClrMapping/>
+  </p:clrMapOvr>
+  <p:timing>
+    <p:tnLst>
+      <p:par>
+        <p:cTn id="1" dur="indefinite" restart="never" nodeType="tmRoot"/>
+      </p:par>
+    </p:tnLst>
+  </p:timing>
+</p:sld>
+</file>
+
+<file path=ppt/slides/slide18.xml><?xml version="1.0" encoding="utf-8"?>
+<p:sld xmlns:a="http://schemas.openxmlformats.org/drawingml/2006/main" xmlns:r="http://schemas.openxmlformats.org/officeDocument/2006/relationships" xmlns:p="http://schemas.openxmlformats.org/presentationml/2006/main">
+  <p:cSld>
+    <p:bg>
+      <p:bgPr>
+        <a:solidFill>
+          <a:schemeClr val="bg1"/>
+        </a:solidFill>
+        <a:effectLst/>
+      </p:bgPr>
+    </p:bg>
+    <p:spTree>
+      <p:nvGrpSpPr>
+        <p:cNvPr id="1" name=""/>
+        <p:cNvGrpSpPr/>
+        <p:nvPr/>
+      </p:nvGrpSpPr>
+      <p:grpSpPr>
+        <a:xfrm>
+          <a:off x="0" y="0"/>
+          <a:ext cx="0" cy="0"/>
+          <a:chOff x="0" y="0"/>
+          <a:chExt cx="0" cy="0"/>
+        </a:xfrm>
+      </p:grpSpPr>
+      <p:sp>
+        <p:nvSpPr>
+          <p:cNvPr id="2" name="Title 1"/>
+          <p:cNvSpPr>
+            <a:spLocks noGrp="1"/>
+          </p:cNvSpPr>
+          <p:nvPr>
+            <p:ph type="title"/>
+          </p:nvPr>
+        </p:nvSpPr>
         <p:spPr>
           <a:xfrm>
-            <a:off x="1457325" y="4384881"/>
-            <a:ext cx="8058150" cy="1200150"/>
+            <a:off x="1141413" y="-128733"/>
+            <a:ext cx="9905998" cy="1478570"/>
+          </a:xfrm>
+        </p:spPr>
+        <p:txBody>
+          <a:bodyPr/>
+          <a:lstStyle/>
+          <a:p>
+            <a:pPr algn="ctr"/>
+            <a:r>
+              <a:rPr lang="en-US" dirty="0" smtClean="0"/>
+              <a:t>Conclusion</a:t>
+            </a:r>
+            <a:endParaRPr lang="en-US" dirty="0"/>
+          </a:p>
+        </p:txBody>
+      </p:sp>
+      <p:sp>
+        <p:nvSpPr>
+          <p:cNvPr id="3" name="Rectangle 2"/>
+          <p:cNvSpPr/>
+          <p:nvPr/>
+        </p:nvSpPr>
+        <p:spPr>
+          <a:xfrm>
+            <a:off x="1563328" y="1002890"/>
+            <a:ext cx="9232491" cy="5262979"/>
           </a:xfrm>
           <a:prstGeom prst="rect">
             <a:avLst/>
           </a:prstGeom>
         </p:spPr>
-      </p:pic>
+        <p:txBody>
+          <a:bodyPr wrap="square">
+            <a:spAutoFit/>
+          </a:bodyPr>
+          <a:lstStyle/>
+          <a:p>
+            <a:pPr>
+              <a:lnSpc>
+                <a:spcPct val="200000"/>
+              </a:lnSpc>
+              <a:spcAft>
+                <a:spcPts val="800"/>
+              </a:spcAft>
+            </a:pPr>
+            <a:r>
+              <a:rPr lang="en-US" sz="2400" dirty="0">
+                <a:ea typeface="Calibri" panose="020F0502020204030204" pitchFamily="34" charset="0"/>
+                <a:cs typeface="Calibri" panose="020F0502020204030204" pitchFamily="34" charset="0"/>
+              </a:rPr>
+              <a:t>This application was developed in a way to maximize satisfaction from the product owner by presenting constant demos and gathering feedback.  Modern development practices like test driven development, static analysis, vulnerability scanning, and CI/CD enhanced the applications security and stability.  The Security Lab Manager is a great tool for learning security in a classroom setting safely.</a:t>
+            </a:r>
+            <a:endParaRPr lang="en-US" sz="2400" dirty="0">
+              <a:effectLst/>
+              <a:ea typeface="Calibri" panose="020F0502020204030204" pitchFamily="34" charset="0"/>
+              <a:cs typeface="Calibri" panose="020F0502020204030204" pitchFamily="34" charset="0"/>
+            </a:endParaRPr>
+          </a:p>
+        </p:txBody>
+      </p:sp>
     </p:spTree>
     <p:extLst>
       <p:ext uri="{BB962C8B-B14F-4D97-AF65-F5344CB8AC3E}">
-        <p14:creationId xmlns:p14="http://schemas.microsoft.com/office/powerpoint/2010/main" val="2687863557"/>
+        <p14:creationId xmlns:p14="http://schemas.microsoft.com/office/powerpoint/2010/main" val="2635601856"/>
       </p:ext>
     </p:extLst>
   </p:cSld>
@@ -15068,6 +16662,14 @@
 <file path=ppt/slides/slide2.xml><?xml version="1.0" encoding="utf-8"?>
 <p:sld xmlns:a="http://schemas.openxmlformats.org/drawingml/2006/main" xmlns:r="http://schemas.openxmlformats.org/officeDocument/2006/relationships" xmlns:p="http://schemas.openxmlformats.org/presentationml/2006/main">
   <p:cSld>
+    <p:bg>
+      <p:bgPr>
+        <a:solidFill>
+          <a:schemeClr val="bg1"/>
+        </a:solidFill>
+        <a:effectLst/>
+      </p:bgPr>
+    </p:bg>
     <p:spTree>
       <p:nvGrpSpPr>
         <p:cNvPr id="1" name=""/>
@@ -15099,18 +16701,10 @@
           <a:p>
             <a:pPr algn="ctr"/>
             <a:r>
-              <a:rPr lang="en-US" dirty="0" smtClean="0">
-                <a:solidFill>
-                  <a:schemeClr val="bg1"/>
-                </a:solidFill>
-              </a:rPr>
+              <a:rPr lang="en-US" dirty="0" smtClean="0"/>
               <a:t>Security Engineering</a:t>
             </a:r>
-            <a:endParaRPr lang="en-US" dirty="0">
-              <a:solidFill>
-                <a:schemeClr val="bg1"/>
-              </a:solidFill>
-            </a:endParaRPr>
+            <a:endParaRPr lang="en-US" dirty="0"/>
           </a:p>
         </p:txBody>
       </p:sp>
@@ -15132,48 +16726,28 @@
           <a:lstStyle/>
           <a:p>
             <a:r>
-              <a:rPr lang="en-US" sz="2800" dirty="0" smtClean="0">
-                <a:solidFill>
-                  <a:schemeClr val="tx2"/>
-                </a:solidFill>
-              </a:rPr>
+              <a:rPr lang="en-US" sz="2800" dirty="0" smtClean="0"/>
               <a:t>High demand for cyber security jobs</a:t>
             </a:r>
           </a:p>
           <a:p>
             <a:r>
-              <a:rPr lang="en-US" sz="2800" dirty="0" smtClean="0">
-                <a:solidFill>
-                  <a:schemeClr val="tx2"/>
-                </a:solidFill>
-              </a:rPr>
+              <a:rPr lang="en-US" sz="2800" dirty="0" smtClean="0"/>
               <a:t>Secure coding for desktop and web application required for developers</a:t>
             </a:r>
           </a:p>
           <a:p>
             <a:r>
-              <a:rPr lang="en-US" sz="2800" dirty="0" smtClean="0">
-                <a:solidFill>
-                  <a:schemeClr val="tx2"/>
-                </a:solidFill>
-              </a:rPr>
+              <a:rPr lang="en-US" sz="2800" dirty="0" smtClean="0"/>
               <a:t>Abuse case and fuzz testing required for production software</a:t>
             </a:r>
           </a:p>
           <a:p>
             <a:r>
-              <a:rPr lang="en-US" sz="2800" dirty="0" smtClean="0">
-                <a:solidFill>
-                  <a:schemeClr val="tx2"/>
-                </a:solidFill>
-              </a:rPr>
+              <a:rPr lang="en-US" sz="2800" dirty="0" smtClean="0"/>
               <a:t>Reverse engineers require knowledge of memory management/software flaws</a:t>
             </a:r>
-            <a:endParaRPr lang="en-US" sz="2800" dirty="0">
-              <a:solidFill>
-                <a:schemeClr val="tx2"/>
-              </a:solidFill>
-            </a:endParaRPr>
+            <a:endParaRPr lang="en-US" sz="2800" dirty="0"/>
           </a:p>
         </p:txBody>
       </p:sp>
@@ -15200,6 +16774,14 @@
 <file path=ppt/slides/slide3.xml><?xml version="1.0" encoding="utf-8"?>
 <p:sld xmlns:a="http://schemas.openxmlformats.org/drawingml/2006/main" xmlns:r="http://schemas.openxmlformats.org/officeDocument/2006/relationships" xmlns:p="http://schemas.openxmlformats.org/presentationml/2006/main">
   <p:cSld>
+    <p:bg>
+      <p:bgPr>
+        <a:solidFill>
+          <a:schemeClr val="bg1"/>
+        </a:solidFill>
+        <a:effectLst/>
+      </p:bgPr>
+    </p:bg>
     <p:spTree>
       <p:nvGrpSpPr>
         <p:cNvPr id="1" name=""/>
@@ -15231,18 +16813,10 @@
           <a:p>
             <a:pPr algn="ctr"/>
             <a:r>
-              <a:rPr lang="en-US" dirty="0" smtClean="0">
-                <a:solidFill>
-                  <a:schemeClr val="bg1"/>
-                </a:solidFill>
-              </a:rPr>
+              <a:rPr lang="en-US" dirty="0" smtClean="0"/>
               <a:t>Learning Resources</a:t>
             </a:r>
-            <a:endParaRPr lang="en-US" dirty="0">
-              <a:solidFill>
-                <a:schemeClr val="bg1"/>
-              </a:solidFill>
-            </a:endParaRPr>
+            <a:endParaRPr lang="en-US" dirty="0"/>
           </a:p>
         </p:txBody>
       </p:sp>
@@ -15264,31 +16838,19 @@
           <a:lstStyle/>
           <a:p>
             <a:r>
-              <a:rPr lang="en-US" sz="2800" dirty="0" smtClean="0">
-                <a:solidFill>
-                  <a:schemeClr val="tx2"/>
-                </a:solidFill>
-              </a:rPr>
+              <a:rPr lang="en-US" sz="2800" dirty="0" smtClean="0"/>
               <a:t>Books with short answer questions</a:t>
             </a:r>
           </a:p>
           <a:p>
             <a:r>
-              <a:rPr lang="en-US" sz="2800" dirty="0" smtClean="0">
-                <a:solidFill>
-                  <a:schemeClr val="tx2"/>
-                </a:solidFill>
-              </a:rPr>
+              <a:rPr lang="en-US" sz="2800" dirty="0" smtClean="0"/>
               <a:t>Capture the flag competitions</a:t>
             </a:r>
           </a:p>
           <a:p>
             <a:r>
-              <a:rPr lang="en-US" sz="2800" dirty="0" smtClean="0">
-                <a:solidFill>
-                  <a:schemeClr val="tx2"/>
-                </a:solidFill>
-              </a:rPr>
+              <a:rPr lang="en-US" sz="2800" dirty="0" smtClean="0"/>
               <a:t>Setup own virtual hacking environment</a:t>
             </a:r>
           </a:p>
@@ -15317,6 +16879,14 @@
 <file path=ppt/slides/slide4.xml><?xml version="1.0" encoding="utf-8"?>
 <p:sld xmlns:a="http://schemas.openxmlformats.org/drawingml/2006/main" xmlns:r="http://schemas.openxmlformats.org/officeDocument/2006/relationships" xmlns:p="http://schemas.openxmlformats.org/presentationml/2006/main">
   <p:cSld>
+    <p:bg>
+      <p:bgPr>
+        <a:solidFill>
+          <a:schemeClr val="bg1"/>
+        </a:solidFill>
+        <a:effectLst/>
+      </p:bgPr>
+    </p:bg>
     <p:spTree>
       <p:nvGrpSpPr>
         <p:cNvPr id="1" name=""/>
@@ -15348,18 +16918,10 @@
           <a:p>
             <a:pPr algn="ctr"/>
             <a:r>
-              <a:rPr lang="en-US" dirty="0" smtClean="0">
-                <a:solidFill>
-                  <a:schemeClr val="bg1"/>
-                </a:solidFill>
-              </a:rPr>
+              <a:rPr lang="en-US" dirty="0" smtClean="0"/>
               <a:t>Hands on Learning</a:t>
             </a:r>
-            <a:endParaRPr lang="en-US" dirty="0">
-              <a:solidFill>
-                <a:schemeClr val="bg1"/>
-              </a:solidFill>
-            </a:endParaRPr>
+            <a:endParaRPr lang="en-US" dirty="0"/>
           </a:p>
         </p:txBody>
       </p:sp>
@@ -15381,31 +16943,19 @@
           <a:lstStyle/>
           <a:p>
             <a:r>
-              <a:rPr lang="en-US" sz="2800" dirty="0" smtClean="0">
-                <a:solidFill>
-                  <a:schemeClr val="tx2"/>
-                </a:solidFill>
-              </a:rPr>
+              <a:rPr lang="en-US" sz="2800" dirty="0" smtClean="0"/>
               <a:t>How do we allow students to virtualize exercises?</a:t>
             </a:r>
           </a:p>
           <a:p>
             <a:r>
-              <a:rPr lang="en-US" sz="2800" dirty="0" smtClean="0">
-                <a:solidFill>
-                  <a:schemeClr val="tx2"/>
-                </a:solidFill>
-              </a:rPr>
+              <a:rPr lang="en-US" sz="2800" dirty="0" smtClean="0"/>
               <a:t>What is the fastest way possible to do this?</a:t>
             </a:r>
           </a:p>
           <a:p>
             <a:r>
-              <a:rPr lang="en-US" sz="2800" dirty="0" smtClean="0">
-                <a:solidFill>
-                  <a:schemeClr val="tx2"/>
-                </a:solidFill>
-              </a:rPr>
+              <a:rPr lang="en-US" sz="2800" dirty="0" smtClean="0"/>
               <a:t>Does this require the students to have powerful computing resources?</a:t>
             </a:r>
           </a:p>
@@ -15434,6 +16984,14 @@
 <file path=ppt/slides/slide5.xml><?xml version="1.0" encoding="utf-8"?>
 <p:sld xmlns:a="http://schemas.openxmlformats.org/drawingml/2006/main" xmlns:r="http://schemas.openxmlformats.org/officeDocument/2006/relationships" xmlns:p="http://schemas.openxmlformats.org/presentationml/2006/main">
   <p:cSld>
+    <p:bg>
+      <p:bgPr>
+        <a:solidFill>
+          <a:schemeClr val="bg1"/>
+        </a:solidFill>
+        <a:effectLst/>
+      </p:bgPr>
+    </p:bg>
     <p:spTree>
       <p:nvGrpSpPr>
         <p:cNvPr id="1" name=""/>
@@ -15465,18 +17023,10 @@
           <a:p>
             <a:pPr algn="ctr"/>
             <a:r>
-              <a:rPr lang="en-US" dirty="0" smtClean="0">
-                <a:solidFill>
-                  <a:schemeClr val="bg1"/>
-                </a:solidFill>
-              </a:rPr>
+              <a:rPr lang="en-US" dirty="0" smtClean="0"/>
               <a:t>Manage virtual machines</a:t>
             </a:r>
-            <a:endParaRPr lang="en-US" dirty="0">
-              <a:solidFill>
-                <a:schemeClr val="bg1"/>
-              </a:solidFill>
-            </a:endParaRPr>
+            <a:endParaRPr lang="en-US" dirty="0"/>
           </a:p>
         </p:txBody>
       </p:sp>
@@ -15503,36 +17053,20 @@
           <a:lstStyle/>
           <a:p>
             <a:r>
-              <a:rPr lang="en-US" sz="2800" dirty="0" smtClean="0">
-                <a:solidFill>
-                  <a:schemeClr val="tx2"/>
-                </a:solidFill>
-              </a:rPr>
+              <a:rPr lang="en-US" sz="2800" dirty="0" smtClean="0"/>
               <a:t>Students and Professors</a:t>
             </a:r>
           </a:p>
           <a:p>
             <a:r>
-              <a:rPr lang="en-US" sz="2800" dirty="0" smtClean="0">
-                <a:solidFill>
-                  <a:schemeClr val="tx2"/>
-                </a:solidFill>
-              </a:rPr>
+              <a:rPr lang="en-US" sz="2800" dirty="0" smtClean="0"/>
               <a:t>Training</a:t>
             </a:r>
-            <a:endParaRPr lang="en-US" sz="2800" dirty="0">
-              <a:solidFill>
-                <a:schemeClr val="tx2"/>
-              </a:solidFill>
-            </a:endParaRPr>
+            <a:endParaRPr lang="en-US" sz="2800" dirty="0"/>
           </a:p>
           <a:p>
             <a:r>
-              <a:rPr lang="en-US" sz="2800" dirty="0" smtClean="0">
-                <a:solidFill>
-                  <a:schemeClr val="tx2"/>
-                </a:solidFill>
-              </a:rPr>
+              <a:rPr lang="en-US" sz="2800" dirty="0" smtClean="0"/>
               <a:t>Any class size with little setup time</a:t>
             </a:r>
           </a:p>
@@ -15561,6 +17095,14 @@
 <file path=ppt/slides/slide6.xml><?xml version="1.0" encoding="utf-8"?>
 <p:sld xmlns:a="http://schemas.openxmlformats.org/drawingml/2006/main" xmlns:r="http://schemas.openxmlformats.org/officeDocument/2006/relationships" xmlns:p="http://schemas.openxmlformats.org/presentationml/2006/main">
   <p:cSld>
+    <p:bg>
+      <p:bgPr>
+        <a:solidFill>
+          <a:schemeClr val="bg1"/>
+        </a:solidFill>
+        <a:effectLst/>
+      </p:bgPr>
+    </p:bg>
     <p:spTree>
       <p:nvGrpSpPr>
         <p:cNvPr id="1" name=""/>
@@ -15585,193 +17127,17 @@
             <p:ph type="title"/>
           </p:nvPr>
         </p:nvSpPr>
-        <p:spPr>
-          <a:xfrm>
-            <a:off x="1141412" y="530028"/>
-            <a:ext cx="9905998" cy="1478570"/>
-          </a:xfrm>
-        </p:spPr>
+        <p:spPr/>
         <p:txBody>
           <a:bodyPr/>
           <a:lstStyle/>
           <a:p>
             <a:pPr algn="ctr"/>
             <a:r>
-              <a:rPr lang="en-US" dirty="0" smtClean="0">
-                <a:solidFill>
-                  <a:schemeClr val="bg1"/>
-                </a:solidFill>
-              </a:rPr>
-              <a:t>Architecture Overview</a:t>
-            </a:r>
-            <a:endParaRPr lang="en-US" dirty="0">
-              <a:solidFill>
-                <a:schemeClr val="bg1"/>
-              </a:solidFill>
-            </a:endParaRPr>
-          </a:p>
-        </p:txBody>
-      </p:sp>
-      <p:pic>
-        <p:nvPicPr>
-          <p:cNvPr id="1026" name="Picture 2" descr="https://github.com/so87/Security-Lab-Manager/raw/dev/documentation/high-level-design.PNG"/>
-          <p:cNvPicPr>
-            <a:picLocks noChangeAspect="1" noChangeArrowheads="1"/>
-          </p:cNvPicPr>
-          <p:nvPr/>
-        </p:nvPicPr>
-        <p:blipFill>
-          <a:blip r:embed="rId3">
-            <a:extLst>
-              <a:ext uri="{28A0092B-C50C-407E-A947-70E740481C1C}">
-                <a14:useLocalDpi xmlns:a14="http://schemas.microsoft.com/office/drawing/2010/main" val="0"/>
-              </a:ext>
-            </a:extLst>
-          </a:blip>
-          <a:srcRect/>
-          <a:stretch>
-            <a:fillRect/>
-          </a:stretch>
-        </p:blipFill>
-        <p:spPr bwMode="auto">
-          <a:xfrm>
-            <a:off x="5378245" y="1710813"/>
-            <a:ext cx="6371303" cy="4827639"/>
-          </a:xfrm>
-          <a:prstGeom prst="rect">
-            <a:avLst/>
-          </a:prstGeom>
-          <a:noFill/>
-          <a:extLst>
-            <a:ext uri="{909E8E84-426E-40DD-AFC4-6F175D3DCCD1}">
-              <a14:hiddenFill xmlns:a14="http://schemas.microsoft.com/office/drawing/2010/main">
-                <a:solidFill>
-                  <a:srgbClr val="FFFFFF"/>
-                </a:solidFill>
-              </a14:hiddenFill>
-            </a:ext>
-          </a:extLst>
-        </p:spPr>
-      </p:pic>
-      <p:sp>
-        <p:nvSpPr>
-          <p:cNvPr id="5" name="Content Placeholder 2"/>
-          <p:cNvSpPr>
-            <a:spLocks noGrp="1"/>
-          </p:cNvSpPr>
-          <p:nvPr>
-            <p:ph idx="1"/>
-          </p:nvPr>
-        </p:nvSpPr>
-        <p:spPr>
-          <a:xfrm>
-            <a:off x="1141412" y="1710813"/>
-            <a:ext cx="4836601" cy="4080388"/>
-          </a:xfrm>
-        </p:spPr>
-        <p:txBody>
-          <a:bodyPr>
-            <a:normAutofit/>
-          </a:bodyPr>
-          <a:lstStyle/>
-          <a:p>
-            <a:r>
-              <a:rPr lang="en-US" sz="2800" dirty="0" smtClean="0">
-                <a:solidFill>
-                  <a:schemeClr val="tx2"/>
-                </a:solidFill>
-              </a:rPr>
-              <a:t>Client/Server</a:t>
-            </a:r>
-          </a:p>
-          <a:p>
-            <a:r>
-              <a:rPr lang="en-US" sz="2800" dirty="0" smtClean="0">
-                <a:solidFill>
-                  <a:schemeClr val="tx2"/>
-                </a:solidFill>
-              </a:rPr>
-              <a:t>Web Application</a:t>
-            </a:r>
-          </a:p>
-          <a:p>
-            <a:r>
-              <a:rPr lang="en-US" sz="2800" dirty="0" smtClean="0">
-                <a:solidFill>
-                  <a:schemeClr val="tx2"/>
-                </a:solidFill>
-              </a:rPr>
-              <a:t>Starts/Stops Docker containers</a:t>
-            </a:r>
-          </a:p>
-        </p:txBody>
-      </p:sp>
-    </p:spTree>
-    <p:extLst>
-      <p:ext uri="{BB962C8B-B14F-4D97-AF65-F5344CB8AC3E}">
-        <p14:creationId xmlns:p14="http://schemas.microsoft.com/office/powerpoint/2010/main" val="4056442777"/>
-      </p:ext>
-    </p:extLst>
-  </p:cSld>
-  <p:clrMapOvr>
-    <a:masterClrMapping/>
-  </p:clrMapOvr>
-  <p:timing>
-    <p:tnLst>
-      <p:par>
-        <p:cTn id="1" dur="indefinite" restart="never" nodeType="tmRoot"/>
-      </p:par>
-    </p:tnLst>
-  </p:timing>
-</p:sld>
-</file>
-
-<file path=ppt/slides/slide7.xml><?xml version="1.0" encoding="utf-8"?>
-<p:sld xmlns:a="http://schemas.openxmlformats.org/drawingml/2006/main" xmlns:r="http://schemas.openxmlformats.org/officeDocument/2006/relationships" xmlns:p="http://schemas.openxmlformats.org/presentationml/2006/main">
-  <p:cSld>
-    <p:spTree>
-      <p:nvGrpSpPr>
-        <p:cNvPr id="1" name=""/>
-        <p:cNvGrpSpPr/>
-        <p:nvPr/>
-      </p:nvGrpSpPr>
-      <p:grpSpPr>
-        <a:xfrm>
-          <a:off x="0" y="0"/>
-          <a:ext cx="0" cy="0"/>
-          <a:chOff x="0" y="0"/>
-          <a:chExt cx="0" cy="0"/>
-        </a:xfrm>
-      </p:grpSpPr>
-      <p:sp>
-        <p:nvSpPr>
-          <p:cNvPr id="2" name="Title 1"/>
-          <p:cNvSpPr>
-            <a:spLocks noGrp="1"/>
-          </p:cNvSpPr>
-          <p:nvPr>
-            <p:ph type="title"/>
-          </p:nvPr>
-        </p:nvSpPr>
-        <p:spPr/>
-        <p:txBody>
-          <a:bodyPr/>
-          <a:lstStyle/>
-          <a:p>
-            <a:pPr algn="ctr"/>
-            <a:r>
-              <a:rPr lang="en-US" dirty="0" smtClean="0">
-                <a:solidFill>
-                  <a:schemeClr val="bg1"/>
-                </a:solidFill>
-              </a:rPr>
+              <a:rPr lang="en-US" dirty="0" smtClean="0"/>
               <a:t>Requirements</a:t>
             </a:r>
-            <a:endParaRPr lang="en-US" dirty="0">
-              <a:solidFill>
-                <a:schemeClr val="bg1"/>
-              </a:solidFill>
-            </a:endParaRPr>
+            <a:endParaRPr lang="en-US" dirty="0"/>
           </a:p>
         </p:txBody>
       </p:sp>
@@ -15838,9 +17204,17 @@
 </p:sld>
 </file>
 
-<file path=ppt/slides/slide8.xml><?xml version="1.0" encoding="utf-8"?>
+<file path=ppt/slides/slide7.xml><?xml version="1.0" encoding="utf-8"?>
 <p:sld xmlns:a="http://schemas.openxmlformats.org/drawingml/2006/main" xmlns:r="http://schemas.openxmlformats.org/officeDocument/2006/relationships" xmlns:p="http://schemas.openxmlformats.org/presentationml/2006/main">
   <p:cSld>
+    <p:bg>
+      <p:bgPr>
+        <a:solidFill>
+          <a:schemeClr val="bg1"/>
+        </a:solidFill>
+        <a:effectLst/>
+      </p:bgPr>
+    </p:bg>
     <p:spTree>
       <p:nvGrpSpPr>
         <p:cNvPr id="1" name=""/>
@@ -15872,18 +17246,10 @@
           <a:p>
             <a:pPr algn="ctr"/>
             <a:r>
-              <a:rPr lang="en-US" dirty="0" smtClean="0">
-                <a:solidFill>
-                  <a:schemeClr val="bg1"/>
-                </a:solidFill>
-              </a:rPr>
+              <a:rPr lang="en-US" dirty="0" smtClean="0"/>
               <a:t>Requirements</a:t>
             </a:r>
-            <a:endParaRPr lang="en-US" dirty="0">
-              <a:solidFill>
-                <a:schemeClr val="bg1"/>
-              </a:solidFill>
-            </a:endParaRPr>
+            <a:endParaRPr lang="en-US" dirty="0"/>
           </a:p>
         </p:txBody>
       </p:sp>
@@ -15948,9 +17314,17 @@
 </p:sld>
 </file>
 
-<file path=ppt/slides/slide9.xml><?xml version="1.0" encoding="utf-8"?>
+<file path=ppt/slides/slide8.xml><?xml version="1.0" encoding="utf-8"?>
 <p:sld xmlns:a="http://schemas.openxmlformats.org/drawingml/2006/main" xmlns:r="http://schemas.openxmlformats.org/officeDocument/2006/relationships" xmlns:p="http://schemas.openxmlformats.org/presentationml/2006/main">
   <p:cSld>
+    <p:bg>
+      <p:bgPr>
+        <a:solidFill>
+          <a:schemeClr val="bg1"/>
+        </a:solidFill>
+        <a:effectLst/>
+      </p:bgPr>
+    </p:bg>
     <p:spTree>
       <p:nvGrpSpPr>
         <p:cNvPr id="1" name=""/>
@@ -15975,25 +17349,120 @@
             <p:ph type="title"/>
           </p:nvPr>
         </p:nvSpPr>
-        <p:spPr/>
+        <p:spPr>
+          <a:xfrm>
+            <a:off x="1141412" y="0"/>
+            <a:ext cx="9905998" cy="1478570"/>
+          </a:xfrm>
+        </p:spPr>
         <p:txBody>
           <a:bodyPr/>
           <a:lstStyle/>
           <a:p>
             <a:pPr algn="ctr"/>
             <a:r>
-              <a:rPr lang="en-US" dirty="0" smtClean="0">
-                <a:solidFill>
-                  <a:schemeClr val="bg1"/>
-                </a:solidFill>
-              </a:rPr>
+              <a:rPr lang="en-US" dirty="0" smtClean="0"/>
+              <a:t>Login Page</a:t>
+            </a:r>
+            <a:endParaRPr lang="en-US" dirty="0"/>
+          </a:p>
+        </p:txBody>
+      </p:sp>
+      <p:pic>
+        <p:nvPicPr>
+          <p:cNvPr id="5" name="Picture 4"/>
+          <p:cNvPicPr>
+            <a:picLocks noChangeAspect="1"/>
+          </p:cNvPicPr>
+          <p:nvPr/>
+        </p:nvPicPr>
+        <p:blipFill>
+          <a:blip r:embed="rId3"/>
+          <a:stretch>
+            <a:fillRect/>
+          </a:stretch>
+        </p:blipFill>
+        <p:spPr>
+          <a:xfrm>
+            <a:off x="2353673" y="1604967"/>
+            <a:ext cx="7481477" cy="4986551"/>
+          </a:xfrm>
+          <a:prstGeom prst="rect">
+            <a:avLst/>
+          </a:prstGeom>
+        </p:spPr>
+      </p:pic>
+    </p:spTree>
+    <p:extLst>
+      <p:ext uri="{BB962C8B-B14F-4D97-AF65-F5344CB8AC3E}">
+        <p14:creationId xmlns:p14="http://schemas.microsoft.com/office/powerpoint/2010/main" val="1560655530"/>
+      </p:ext>
+    </p:extLst>
+  </p:cSld>
+  <p:clrMapOvr>
+    <a:masterClrMapping/>
+  </p:clrMapOvr>
+  <p:timing>
+    <p:tnLst>
+      <p:par>
+        <p:cTn id="1" dur="indefinite" restart="never" nodeType="tmRoot"/>
+      </p:par>
+    </p:tnLst>
+  </p:timing>
+</p:sld>
+</file>
+
+<file path=ppt/slides/slide9.xml><?xml version="1.0" encoding="utf-8"?>
+<p:sld xmlns:a="http://schemas.openxmlformats.org/drawingml/2006/main" xmlns:r="http://schemas.openxmlformats.org/officeDocument/2006/relationships" xmlns:p="http://schemas.openxmlformats.org/presentationml/2006/main">
+  <p:cSld>
+    <p:bg>
+      <p:bgPr>
+        <a:solidFill>
+          <a:schemeClr val="bg1"/>
+        </a:solidFill>
+        <a:effectLst/>
+      </p:bgPr>
+    </p:bg>
+    <p:spTree>
+      <p:nvGrpSpPr>
+        <p:cNvPr id="1" name=""/>
+        <p:cNvGrpSpPr/>
+        <p:nvPr/>
+      </p:nvGrpSpPr>
+      <p:grpSpPr>
+        <a:xfrm>
+          <a:off x="0" y="0"/>
+          <a:ext cx="0" cy="0"/>
+          <a:chOff x="0" y="0"/>
+          <a:chExt cx="0" cy="0"/>
+        </a:xfrm>
+      </p:grpSpPr>
+      <p:sp>
+        <p:nvSpPr>
+          <p:cNvPr id="2" name="Title 1"/>
+          <p:cNvSpPr>
+            <a:spLocks noGrp="1"/>
+          </p:cNvSpPr>
+          <p:nvPr>
+            <p:ph type="title"/>
+          </p:nvPr>
+        </p:nvSpPr>
+        <p:spPr>
+          <a:xfrm>
+            <a:off x="1141413" y="0"/>
+            <a:ext cx="9905998" cy="1478570"/>
+          </a:xfrm>
+        </p:spPr>
+        <p:txBody>
+          <a:bodyPr/>
+          <a:lstStyle/>
+          <a:p>
+            <a:pPr algn="ctr"/>
+            <a:r>
+              <a:rPr lang="en-US" dirty="0" smtClean="0"/>
               <a:t>Student Interface</a:t>
             </a:r>
-            <a:endParaRPr lang="en-US" dirty="0">
-              <a:solidFill>
-                <a:schemeClr val="bg1"/>
-              </a:solidFill>
-            </a:endParaRPr>
+            <a:endParaRPr lang="en-US" dirty="0"/>
           </a:p>
         </p:txBody>
       </p:sp>
@@ -16013,8 +17482,8 @@
         </p:blipFill>
         <p:spPr>
           <a:xfrm>
-            <a:off x="2658855" y="1772116"/>
-            <a:ext cx="6871114" cy="4579732"/>
+            <a:off x="2356898" y="1576073"/>
+            <a:ext cx="7475027" cy="4982252"/>
           </a:xfrm>
           <a:prstGeom prst="rect">
             <a:avLst/>
@@ -16044,7 +17513,7 @@
 <file path=ppt/theme/theme1.xml><?xml version="1.0" encoding="utf-8"?>
 <a:theme xmlns:a="http://schemas.openxmlformats.org/drawingml/2006/main" name="Circuit">
   <a:themeElements>
-    <a:clrScheme name="Office 2007-2010">
+    <a:clrScheme name="Red">
       <a:dk1>
         <a:sysClr val="windowText" lastClr="000000"/>
       </a:dk1>
@@ -16052,34 +17521,34 @@
         <a:sysClr val="window" lastClr="FFFFFF"/>
       </a:lt1>
       <a:dk2>
-        <a:srgbClr val="1F497D"/>
+        <a:srgbClr val="323232"/>
       </a:dk2>
       <a:lt2>
-        <a:srgbClr val="EEECE1"/>
+        <a:srgbClr val="E5C243"/>
       </a:lt2>
       <a:accent1>
-        <a:srgbClr val="4F81BD"/>
+        <a:srgbClr val="A5300F"/>
       </a:accent1>
       <a:accent2>
-        <a:srgbClr val="C0504D"/>
+        <a:srgbClr val="D55816"/>
       </a:accent2>
       <a:accent3>
-        <a:srgbClr val="9BBB59"/>
+        <a:srgbClr val="E19825"/>
       </a:accent3>
       <a:accent4>
-        <a:srgbClr val="8064A2"/>
+        <a:srgbClr val="B19C7D"/>
       </a:accent4>
       <a:accent5>
-        <a:srgbClr val="4BACC6"/>
+        <a:srgbClr val="7F5F52"/>
       </a:accent5>
       <a:accent6>
-        <a:srgbClr val="F79646"/>
+        <a:srgbClr val="B27D49"/>
       </a:accent6>
       <a:hlink>
-        <a:srgbClr val="0000FF"/>
+        <a:srgbClr val="6B9F25"/>
       </a:hlink>
       <a:folHlink>
-        <a:srgbClr val="800080"/>
+        <a:srgbClr val="B26B02"/>
       </a:folHlink>
     </a:clrScheme>
     <a:fontScheme name="Circuit">
@@ -16834,7 +18303,7 @@
 </file>
 
 <file path=customXml/itemProps2.xml><?xml version="1.0" encoding="utf-8"?>
-<ds:datastoreItem xmlns:ds="http://schemas.openxmlformats.org/officeDocument/2006/customXml" ds:itemID="{47656399-B68A-442E-910D-1BD1EA01F7D5}">
+<ds:datastoreItem xmlns:ds="http://schemas.openxmlformats.org/officeDocument/2006/customXml" ds:itemID="{373F1B79-E3A1-488F-9590-87D7617D88B4}">
   <ds:schemaRefs>
     <ds:schemaRef ds:uri="http://www.w3.org/2001/XMLSchema"/>
     <ds:schemaRef ds:uri="http://www.boldonjames.com/2008/01/sie/internal/label"/>

</xml_diff>